<commit_message>
Update Container - Präsentation.pptx
</commit_message>
<xml_diff>
--- a/Dokumentation/Container - Präsentation.pptx
+++ b/Dokumentation/Container - Präsentation.pptx
@@ -5,7 +5,7 @@
     <p:sldMasterId id="2147483660" r:id="rId1"/>
   </p:sldMasterIdLst>
   <p:notesMasterIdLst>
-    <p:notesMasterId r:id="rId31"/>
+    <p:notesMasterId r:id="rId33"/>
   </p:notesMasterIdLst>
   <p:sldIdLst>
     <p:sldId id="256" r:id="rId2"/>
@@ -35,8 +35,10 @@
     <p:sldId id="279" r:id="rId26"/>
     <p:sldId id="280" r:id="rId27"/>
     <p:sldId id="281" r:id="rId28"/>
-    <p:sldId id="284" r:id="rId29"/>
-    <p:sldId id="270" r:id="rId30"/>
+    <p:sldId id="291" r:id="rId29"/>
+    <p:sldId id="293" r:id="rId30"/>
+    <p:sldId id="284" r:id="rId31"/>
+    <p:sldId id="270" r:id="rId32"/>
   </p:sldIdLst>
   <p:sldSz cx="12192000" cy="6858000"/>
   <p:notesSz cx="6858000" cy="9144000"/>
@@ -197,6 +199,12 @@
             <p14:sldId id="281"/>
           </p14:sldIdLst>
         </p14:section>
+        <p14:section name="Tests" id="{BD50EBE4-A130-4AC5-B2B6-84A86C6A5203}">
+          <p14:sldIdLst>
+            <p14:sldId id="291"/>
+            <p14:sldId id="293"/>
+          </p14:sldIdLst>
+        </p14:section>
         <p14:section name="Kompilierung" id="{162A76D2-B43A-416B-8B74-09F13CFF9195}">
           <p14:sldIdLst>
             <p14:sldId id="284"/>
@@ -310,7 +318,7 @@
           <a:p>
             <a:fld id="{B82DBB3C-062B-41DD-A7A6-D65BEDC67AC7}" type="datetimeFigureOut">
               <a:rPr lang="de-DE" smtClean="0"/>
-              <a:t>21.09.2021</a:t>
+              <a:t>22.09.2021</a:t>
             </a:fld>
             <a:endParaRPr lang="de-DE"/>
           </a:p>
@@ -792,7 +800,7 @@
           <a:p>
             <a:fld id="{687F1BB1-91A6-493A-8092-589E7D0BC4EF}" type="datetime1">
               <a:rPr lang="de-DE" smtClean="0"/>
-              <a:t>21.09.2021</a:t>
+              <a:t>22.09.2021</a:t>
             </a:fld>
             <a:endParaRPr lang="de-DE"/>
           </a:p>
@@ -962,7 +970,7 @@
           <a:p>
             <a:fld id="{4084A46B-956D-4745-944F-958EA31F732D}" type="datetime1">
               <a:rPr lang="de-DE" smtClean="0"/>
-              <a:t>21.09.2021</a:t>
+              <a:t>22.09.2021</a:t>
             </a:fld>
             <a:endParaRPr lang="de-DE"/>
           </a:p>
@@ -1142,7 +1150,7 @@
           <a:p>
             <a:fld id="{5CFC9353-6ECD-4E4E-9A9A-C1F5889321D4}" type="datetime1">
               <a:rPr lang="de-DE" smtClean="0"/>
-              <a:t>21.09.2021</a:t>
+              <a:t>22.09.2021</a:t>
             </a:fld>
             <a:endParaRPr lang="de-DE"/>
           </a:p>
@@ -1312,7 +1320,7 @@
           <a:p>
             <a:fld id="{7F1F3B81-8A15-474B-B7E5-38287625CD87}" type="datetime1">
               <a:rPr lang="de-DE" smtClean="0"/>
-              <a:t>21.09.2021</a:t>
+              <a:t>22.09.2021</a:t>
             </a:fld>
             <a:endParaRPr lang="de-DE"/>
           </a:p>
@@ -1558,7 +1566,7 @@
           <a:p>
             <a:fld id="{A4D5150D-CD18-40B2-A6B2-D2EA96CAE34C}" type="datetime1">
               <a:rPr lang="de-DE" smtClean="0"/>
-              <a:t>21.09.2021</a:t>
+              <a:t>22.09.2021</a:t>
             </a:fld>
             <a:endParaRPr lang="de-DE"/>
           </a:p>
@@ -1790,7 +1798,7 @@
           <a:p>
             <a:fld id="{F435291A-1E25-48D3-AE6C-1F5A84A8DAAA}" type="datetime1">
               <a:rPr lang="de-DE" smtClean="0"/>
-              <a:t>21.09.2021</a:t>
+              <a:t>22.09.2021</a:t>
             </a:fld>
             <a:endParaRPr lang="de-DE"/>
           </a:p>
@@ -2157,7 +2165,7 @@
           <a:p>
             <a:fld id="{D6D52EB2-CBB8-40AD-BEEE-8F70DA88514A}" type="datetime1">
               <a:rPr lang="de-DE" smtClean="0"/>
-              <a:t>21.09.2021</a:t>
+              <a:t>22.09.2021</a:t>
             </a:fld>
             <a:endParaRPr lang="de-DE"/>
           </a:p>
@@ -2275,7 +2283,7 @@
           <a:p>
             <a:fld id="{70D4ABC5-AF18-4B4F-B68F-5498C237A649}" type="datetime1">
               <a:rPr lang="de-DE" smtClean="0"/>
-              <a:t>21.09.2021</a:t>
+              <a:t>22.09.2021</a:t>
             </a:fld>
             <a:endParaRPr lang="de-DE"/>
           </a:p>
@@ -2370,7 +2378,7 @@
           <a:p>
             <a:fld id="{8E592A3C-0D52-4B8C-ACFB-562E69CAF87E}" type="datetime1">
               <a:rPr lang="de-DE" smtClean="0"/>
-              <a:t>21.09.2021</a:t>
+              <a:t>22.09.2021</a:t>
             </a:fld>
             <a:endParaRPr lang="de-DE"/>
           </a:p>
@@ -2647,7 +2655,7 @@
           <a:p>
             <a:fld id="{4C9EE53A-8BBB-4F82-BEF6-5E7E18990387}" type="datetime1">
               <a:rPr lang="de-DE" smtClean="0"/>
-              <a:t>21.09.2021</a:t>
+              <a:t>22.09.2021</a:t>
             </a:fld>
             <a:endParaRPr lang="de-DE"/>
           </a:p>
@@ -2904,7 +2912,7 @@
           <a:p>
             <a:fld id="{A38161D5-80F6-413D-9DDC-4FA5FAE9FF77}" type="datetime1">
               <a:rPr lang="de-DE" smtClean="0"/>
-              <a:t>21.09.2021</a:t>
+              <a:t>22.09.2021</a:t>
             </a:fld>
             <a:endParaRPr lang="de-DE"/>
           </a:p>
@@ -3117,7 +3125,7 @@
           <a:p>
             <a:fld id="{96FB673C-9F09-4775-8527-C49C77A4DC03}" type="datetime1">
               <a:rPr lang="de-DE" smtClean="0"/>
-              <a:t>21.09.2021</a:t>
+              <a:t>22.09.2021</a:t>
             </a:fld>
             <a:endParaRPr lang="de-DE"/>
           </a:p>
@@ -3528,7 +3536,7 @@
           <p:cNvPr id="2" name="Titel 1">
             <a:extLst>
               <a:ext uri="{FF2B5EF4-FFF2-40B4-BE49-F238E27FC236}">
-                <a16:creationId xmlns:a16="http://schemas.microsoft.com/office/drawing/2014/main" xmlns="" id="{85D7B258-F523-4E91-90AB-2B5F742EF554}"/>
+                <a16:creationId xmlns:a16="http://schemas.microsoft.com/office/drawing/2014/main" id="{85D7B258-F523-4E91-90AB-2B5F742EF554}"/>
               </a:ext>
             </a:extLst>
           </p:cNvPr>
@@ -3572,7 +3580,7 @@
           <p:cNvPr id="3" name="Untertitel 2">
             <a:extLst>
               <a:ext uri="{FF2B5EF4-FFF2-40B4-BE49-F238E27FC236}">
-                <a16:creationId xmlns:a16="http://schemas.microsoft.com/office/drawing/2014/main" xmlns="" id="{C7CFF44E-7ED7-4CD9-A63C-0FE32841B732}"/>
+                <a16:creationId xmlns:a16="http://schemas.microsoft.com/office/drawing/2014/main" id="{C7CFF44E-7ED7-4CD9-A63C-0FE32841B732}"/>
               </a:ext>
             </a:extLst>
           </p:cNvPr>
@@ -3598,15 +3606,7 @@
             </a:r>
             <a:r>
               <a:rPr lang="de-DE" dirty="0"/>
-              <a:t> </a:t>
-            </a:r>
-            <a:r>
-              <a:rPr lang="de-DE" dirty="0" smtClean="0"/>
-              <a:t>	[</a:t>
-            </a:r>
-            <a:r>
-              <a:rPr lang="de-DE" dirty="0"/>
-              <a:t>11141259]</a:t>
+              <a:t> 	[11141259]</a:t>
             </a:r>
           </a:p>
           <a:p>
@@ -3620,15 +3620,7 @@
             </a:r>
             <a:r>
               <a:rPr lang="de-DE" dirty="0"/>
-              <a:t> </a:t>
-            </a:r>
-            <a:r>
-              <a:rPr lang="de-DE" dirty="0" smtClean="0"/>
-              <a:t>	[</a:t>
-            </a:r>
-            <a:r>
-              <a:rPr lang="de-DE" dirty="0"/>
-              <a:t>11140150]</a:t>
+              <a:t> 	[11140150]</a:t>
             </a:r>
           </a:p>
         </p:txBody>
@@ -3668,7 +3660,7 @@
           <p:cNvPr id="10" name="Foliennummernplatzhalter 9">
             <a:extLst>
               <a:ext uri="{FF2B5EF4-FFF2-40B4-BE49-F238E27FC236}">
-                <a16:creationId xmlns:a16="http://schemas.microsoft.com/office/drawing/2014/main" xmlns="" id="{D931436D-0B25-4BC2-AB85-D177B4C7ED90}"/>
+                <a16:creationId xmlns:a16="http://schemas.microsoft.com/office/drawing/2014/main" id="{D931436D-0B25-4BC2-AB85-D177B4C7ED90}"/>
               </a:ext>
             </a:extLst>
           </p:cNvPr>
@@ -3718,7 +3710,7 @@
           <p:cNvPr id="12" name="Gerader Verbinder 11">
             <a:extLst>
               <a:ext uri="{FF2B5EF4-FFF2-40B4-BE49-F238E27FC236}">
-                <a16:creationId xmlns:a16="http://schemas.microsoft.com/office/drawing/2014/main" xmlns="" id="{4A855513-E5C1-4F05-A8FD-33AC62C22A5E}"/>
+                <a16:creationId xmlns:a16="http://schemas.microsoft.com/office/drawing/2014/main" id="{4A855513-E5C1-4F05-A8FD-33AC62C22A5E}"/>
               </a:ext>
             </a:extLst>
           </p:cNvPr>
@@ -3759,7 +3751,7 @@
           <p:cNvPr id="13" name="Gerader Verbinder 12">
             <a:extLst>
               <a:ext uri="{FF2B5EF4-FFF2-40B4-BE49-F238E27FC236}">
-                <a16:creationId xmlns:a16="http://schemas.microsoft.com/office/drawing/2014/main" xmlns="" id="{F2778992-5E28-437C-AEA9-F9BBD6E6F5BB}"/>
+                <a16:creationId xmlns:a16="http://schemas.microsoft.com/office/drawing/2014/main" id="{F2778992-5E28-437C-AEA9-F9BBD6E6F5BB}"/>
               </a:ext>
             </a:extLst>
           </p:cNvPr>
@@ -3800,7 +3792,7 @@
           <p:cNvPr id="14" name="Textfeld 13">
             <a:extLst>
               <a:ext uri="{FF2B5EF4-FFF2-40B4-BE49-F238E27FC236}">
-                <a16:creationId xmlns:a16="http://schemas.microsoft.com/office/drawing/2014/main" xmlns="" id="{6CF8FF9D-8A98-4CFA-94C2-E2074112639C}"/>
+                <a16:creationId xmlns:a16="http://schemas.microsoft.com/office/drawing/2014/main" id="{6CF8FF9D-8A98-4CFA-94C2-E2074112639C}"/>
               </a:ext>
             </a:extLst>
           </p:cNvPr>
@@ -3836,7 +3828,7 @@
           <p:cNvPr id="6" name="Textfeld 5">
             <a:extLst>
               <a:ext uri="{FF2B5EF4-FFF2-40B4-BE49-F238E27FC236}">
-                <a16:creationId xmlns:a16="http://schemas.microsoft.com/office/drawing/2014/main" xmlns="" id="{8E05CB3E-FC8B-4C84-8452-A027AF29808D}"/>
+                <a16:creationId xmlns:a16="http://schemas.microsoft.com/office/drawing/2014/main" id="{8E05CB3E-FC8B-4C84-8452-A027AF29808D}"/>
               </a:ext>
             </a:extLst>
           </p:cNvPr>
@@ -3881,7 +3873,7 @@
           <p:cNvPr id="3" name="Textfeld 2">
             <a:extLst>
               <a:ext uri="{FF2B5EF4-FFF2-40B4-BE49-F238E27FC236}">
-                <a16:creationId xmlns:a16="http://schemas.microsoft.com/office/drawing/2014/main" xmlns="" id="{B616C74B-1A1C-4612-8D7A-608508876D6B}"/>
+                <a16:creationId xmlns:a16="http://schemas.microsoft.com/office/drawing/2014/main" id="{B616C74B-1A1C-4612-8D7A-608508876D6B}"/>
               </a:ext>
             </a:extLst>
           </p:cNvPr>
@@ -3916,7 +3908,7 @@
           <p:cNvPr id="5" name="Grafik 4">
             <a:extLst>
               <a:ext uri="{FF2B5EF4-FFF2-40B4-BE49-F238E27FC236}">
-                <a16:creationId xmlns:a16="http://schemas.microsoft.com/office/drawing/2014/main" xmlns="" id="{0140E6FD-8193-4AAF-9992-5309DF24B841}"/>
+                <a16:creationId xmlns:a16="http://schemas.microsoft.com/office/drawing/2014/main" id="{0140E6FD-8193-4AAF-9992-5309DF24B841}"/>
               </a:ext>
             </a:extLst>
           </p:cNvPr>
@@ -3976,7 +3968,7 @@
           <p:cNvPr id="10" name="Foliennummernplatzhalter 9">
             <a:extLst>
               <a:ext uri="{FF2B5EF4-FFF2-40B4-BE49-F238E27FC236}">
-                <a16:creationId xmlns:a16="http://schemas.microsoft.com/office/drawing/2014/main" xmlns="" id="{D931436D-0B25-4BC2-AB85-D177B4C7ED90}"/>
+                <a16:creationId xmlns:a16="http://schemas.microsoft.com/office/drawing/2014/main" id="{D931436D-0B25-4BC2-AB85-D177B4C7ED90}"/>
               </a:ext>
             </a:extLst>
           </p:cNvPr>
@@ -4026,7 +4018,7 @@
           <p:cNvPr id="12" name="Gerader Verbinder 11">
             <a:extLst>
               <a:ext uri="{FF2B5EF4-FFF2-40B4-BE49-F238E27FC236}">
-                <a16:creationId xmlns:a16="http://schemas.microsoft.com/office/drawing/2014/main" xmlns="" id="{4A855513-E5C1-4F05-A8FD-33AC62C22A5E}"/>
+                <a16:creationId xmlns:a16="http://schemas.microsoft.com/office/drawing/2014/main" id="{4A855513-E5C1-4F05-A8FD-33AC62C22A5E}"/>
               </a:ext>
             </a:extLst>
           </p:cNvPr>
@@ -4067,7 +4059,7 @@
           <p:cNvPr id="13" name="Gerader Verbinder 12">
             <a:extLst>
               <a:ext uri="{FF2B5EF4-FFF2-40B4-BE49-F238E27FC236}">
-                <a16:creationId xmlns:a16="http://schemas.microsoft.com/office/drawing/2014/main" xmlns="" id="{F2778992-5E28-437C-AEA9-F9BBD6E6F5BB}"/>
+                <a16:creationId xmlns:a16="http://schemas.microsoft.com/office/drawing/2014/main" id="{F2778992-5E28-437C-AEA9-F9BBD6E6F5BB}"/>
               </a:ext>
             </a:extLst>
           </p:cNvPr>
@@ -4108,7 +4100,7 @@
           <p:cNvPr id="14" name="Textfeld 13">
             <a:extLst>
               <a:ext uri="{FF2B5EF4-FFF2-40B4-BE49-F238E27FC236}">
-                <a16:creationId xmlns:a16="http://schemas.microsoft.com/office/drawing/2014/main" xmlns="" id="{6CF8FF9D-8A98-4CFA-94C2-E2074112639C}"/>
+                <a16:creationId xmlns:a16="http://schemas.microsoft.com/office/drawing/2014/main" id="{6CF8FF9D-8A98-4CFA-94C2-E2074112639C}"/>
               </a:ext>
             </a:extLst>
           </p:cNvPr>
@@ -4144,7 +4136,7 @@
           <p:cNvPr id="6" name="Textfeld 5">
             <a:extLst>
               <a:ext uri="{FF2B5EF4-FFF2-40B4-BE49-F238E27FC236}">
-                <a16:creationId xmlns:a16="http://schemas.microsoft.com/office/drawing/2014/main" xmlns="" id="{8E05CB3E-FC8B-4C84-8452-A027AF29808D}"/>
+                <a16:creationId xmlns:a16="http://schemas.microsoft.com/office/drawing/2014/main" id="{8E05CB3E-FC8B-4C84-8452-A027AF29808D}"/>
               </a:ext>
             </a:extLst>
           </p:cNvPr>
@@ -4189,7 +4181,7 @@
           <p:cNvPr id="3" name="Textfeld 2">
             <a:extLst>
               <a:ext uri="{FF2B5EF4-FFF2-40B4-BE49-F238E27FC236}">
-                <a16:creationId xmlns:a16="http://schemas.microsoft.com/office/drawing/2014/main" xmlns="" id="{B616C74B-1A1C-4612-8D7A-608508876D6B}"/>
+                <a16:creationId xmlns:a16="http://schemas.microsoft.com/office/drawing/2014/main" id="{B616C74B-1A1C-4612-8D7A-608508876D6B}"/>
               </a:ext>
             </a:extLst>
           </p:cNvPr>
@@ -4224,7 +4216,7 @@
           <p:cNvPr id="15" name="Textfeld 14">
             <a:extLst>
               <a:ext uri="{FF2B5EF4-FFF2-40B4-BE49-F238E27FC236}">
-                <a16:creationId xmlns:a16="http://schemas.microsoft.com/office/drawing/2014/main" xmlns="" id="{F66983C5-190C-4255-9AC6-9702FE35C815}"/>
+                <a16:creationId xmlns:a16="http://schemas.microsoft.com/office/drawing/2014/main" id="{F66983C5-190C-4255-9AC6-9702FE35C815}"/>
               </a:ext>
             </a:extLst>
           </p:cNvPr>
@@ -5390,7 +5382,7 @@
           <p:cNvPr id="10" name="Foliennummernplatzhalter 9">
             <a:extLst>
               <a:ext uri="{FF2B5EF4-FFF2-40B4-BE49-F238E27FC236}">
-                <a16:creationId xmlns:a16="http://schemas.microsoft.com/office/drawing/2014/main" xmlns="" id="{D931436D-0B25-4BC2-AB85-D177B4C7ED90}"/>
+                <a16:creationId xmlns:a16="http://schemas.microsoft.com/office/drawing/2014/main" id="{D931436D-0B25-4BC2-AB85-D177B4C7ED90}"/>
               </a:ext>
             </a:extLst>
           </p:cNvPr>
@@ -5440,7 +5432,7 @@
           <p:cNvPr id="12" name="Gerader Verbinder 11">
             <a:extLst>
               <a:ext uri="{FF2B5EF4-FFF2-40B4-BE49-F238E27FC236}">
-                <a16:creationId xmlns:a16="http://schemas.microsoft.com/office/drawing/2014/main" xmlns="" id="{4A855513-E5C1-4F05-A8FD-33AC62C22A5E}"/>
+                <a16:creationId xmlns:a16="http://schemas.microsoft.com/office/drawing/2014/main" id="{4A855513-E5C1-4F05-A8FD-33AC62C22A5E}"/>
               </a:ext>
             </a:extLst>
           </p:cNvPr>
@@ -5481,7 +5473,7 @@
           <p:cNvPr id="13" name="Gerader Verbinder 12">
             <a:extLst>
               <a:ext uri="{FF2B5EF4-FFF2-40B4-BE49-F238E27FC236}">
-                <a16:creationId xmlns:a16="http://schemas.microsoft.com/office/drawing/2014/main" xmlns="" id="{F2778992-5E28-437C-AEA9-F9BBD6E6F5BB}"/>
+                <a16:creationId xmlns:a16="http://schemas.microsoft.com/office/drawing/2014/main" id="{F2778992-5E28-437C-AEA9-F9BBD6E6F5BB}"/>
               </a:ext>
             </a:extLst>
           </p:cNvPr>
@@ -5522,7 +5514,7 @@
           <p:cNvPr id="14" name="Textfeld 13">
             <a:extLst>
               <a:ext uri="{FF2B5EF4-FFF2-40B4-BE49-F238E27FC236}">
-                <a16:creationId xmlns:a16="http://schemas.microsoft.com/office/drawing/2014/main" xmlns="" id="{6CF8FF9D-8A98-4CFA-94C2-E2074112639C}"/>
+                <a16:creationId xmlns:a16="http://schemas.microsoft.com/office/drawing/2014/main" id="{6CF8FF9D-8A98-4CFA-94C2-E2074112639C}"/>
               </a:ext>
             </a:extLst>
           </p:cNvPr>
@@ -5558,7 +5550,7 @@
           <p:cNvPr id="6" name="Textfeld 5">
             <a:extLst>
               <a:ext uri="{FF2B5EF4-FFF2-40B4-BE49-F238E27FC236}">
-                <a16:creationId xmlns:a16="http://schemas.microsoft.com/office/drawing/2014/main" xmlns="" id="{8E05CB3E-FC8B-4C84-8452-A027AF29808D}"/>
+                <a16:creationId xmlns:a16="http://schemas.microsoft.com/office/drawing/2014/main" id="{8E05CB3E-FC8B-4C84-8452-A027AF29808D}"/>
               </a:ext>
             </a:extLst>
           </p:cNvPr>
@@ -5603,7 +5595,7 @@
           <p:cNvPr id="3" name="Textfeld 2">
             <a:extLst>
               <a:ext uri="{FF2B5EF4-FFF2-40B4-BE49-F238E27FC236}">
-                <a16:creationId xmlns:a16="http://schemas.microsoft.com/office/drawing/2014/main" xmlns="" id="{B616C74B-1A1C-4612-8D7A-608508876D6B}"/>
+                <a16:creationId xmlns:a16="http://schemas.microsoft.com/office/drawing/2014/main" id="{B616C74B-1A1C-4612-8D7A-608508876D6B}"/>
               </a:ext>
             </a:extLst>
           </p:cNvPr>
@@ -5638,7 +5630,7 @@
           <p:cNvPr id="11" name="Textfeld 10">
             <a:extLst>
               <a:ext uri="{FF2B5EF4-FFF2-40B4-BE49-F238E27FC236}">
-                <a16:creationId xmlns:a16="http://schemas.microsoft.com/office/drawing/2014/main" xmlns="" id="{C616845B-AC50-4775-A32C-7BB8A4D3274B}"/>
+                <a16:creationId xmlns:a16="http://schemas.microsoft.com/office/drawing/2014/main" id="{C616845B-AC50-4775-A32C-7BB8A4D3274B}"/>
               </a:ext>
             </a:extLst>
           </p:cNvPr>
@@ -6442,7 +6434,7 @@
           <p:cNvPr id="10" name="Foliennummernplatzhalter 9">
             <a:extLst>
               <a:ext uri="{FF2B5EF4-FFF2-40B4-BE49-F238E27FC236}">
-                <a16:creationId xmlns:a16="http://schemas.microsoft.com/office/drawing/2014/main" xmlns="" id="{D931436D-0B25-4BC2-AB85-D177B4C7ED90}"/>
+                <a16:creationId xmlns:a16="http://schemas.microsoft.com/office/drawing/2014/main" id="{D931436D-0B25-4BC2-AB85-D177B4C7ED90}"/>
               </a:ext>
             </a:extLst>
           </p:cNvPr>
@@ -6492,7 +6484,7 @@
           <p:cNvPr id="12" name="Gerader Verbinder 11">
             <a:extLst>
               <a:ext uri="{FF2B5EF4-FFF2-40B4-BE49-F238E27FC236}">
-                <a16:creationId xmlns:a16="http://schemas.microsoft.com/office/drawing/2014/main" xmlns="" id="{4A855513-E5C1-4F05-A8FD-33AC62C22A5E}"/>
+                <a16:creationId xmlns:a16="http://schemas.microsoft.com/office/drawing/2014/main" id="{4A855513-E5C1-4F05-A8FD-33AC62C22A5E}"/>
               </a:ext>
             </a:extLst>
           </p:cNvPr>
@@ -6533,7 +6525,7 @@
           <p:cNvPr id="13" name="Gerader Verbinder 12">
             <a:extLst>
               <a:ext uri="{FF2B5EF4-FFF2-40B4-BE49-F238E27FC236}">
-                <a16:creationId xmlns:a16="http://schemas.microsoft.com/office/drawing/2014/main" xmlns="" id="{F2778992-5E28-437C-AEA9-F9BBD6E6F5BB}"/>
+                <a16:creationId xmlns:a16="http://schemas.microsoft.com/office/drawing/2014/main" id="{F2778992-5E28-437C-AEA9-F9BBD6E6F5BB}"/>
               </a:ext>
             </a:extLst>
           </p:cNvPr>
@@ -6574,7 +6566,7 @@
           <p:cNvPr id="14" name="Textfeld 13">
             <a:extLst>
               <a:ext uri="{FF2B5EF4-FFF2-40B4-BE49-F238E27FC236}">
-                <a16:creationId xmlns:a16="http://schemas.microsoft.com/office/drawing/2014/main" xmlns="" id="{6CF8FF9D-8A98-4CFA-94C2-E2074112639C}"/>
+                <a16:creationId xmlns:a16="http://schemas.microsoft.com/office/drawing/2014/main" id="{6CF8FF9D-8A98-4CFA-94C2-E2074112639C}"/>
               </a:ext>
             </a:extLst>
           </p:cNvPr>
@@ -6610,7 +6602,7 @@
           <p:cNvPr id="6" name="Textfeld 5">
             <a:extLst>
               <a:ext uri="{FF2B5EF4-FFF2-40B4-BE49-F238E27FC236}">
-                <a16:creationId xmlns:a16="http://schemas.microsoft.com/office/drawing/2014/main" xmlns="" id="{8E05CB3E-FC8B-4C84-8452-A027AF29808D}"/>
+                <a16:creationId xmlns:a16="http://schemas.microsoft.com/office/drawing/2014/main" id="{8E05CB3E-FC8B-4C84-8452-A027AF29808D}"/>
               </a:ext>
             </a:extLst>
           </p:cNvPr>
@@ -6655,7 +6647,7 @@
           <p:cNvPr id="8" name="Textfeld 7">
             <a:extLst>
               <a:ext uri="{FF2B5EF4-FFF2-40B4-BE49-F238E27FC236}">
-                <a16:creationId xmlns:a16="http://schemas.microsoft.com/office/drawing/2014/main" xmlns="" id="{4842BEFA-10C3-45C0-8997-167BE0586DAC}"/>
+                <a16:creationId xmlns:a16="http://schemas.microsoft.com/office/drawing/2014/main" id="{4842BEFA-10C3-45C0-8997-167BE0586DAC}"/>
               </a:ext>
             </a:extLst>
           </p:cNvPr>
@@ -6727,7 +6719,7 @@
           <p:cNvPr id="3" name="Textfeld 2">
             <a:extLst>
               <a:ext uri="{FF2B5EF4-FFF2-40B4-BE49-F238E27FC236}">
-                <a16:creationId xmlns:a16="http://schemas.microsoft.com/office/drawing/2014/main" xmlns="" id="{B616C74B-1A1C-4612-8D7A-608508876D6B}"/>
+                <a16:creationId xmlns:a16="http://schemas.microsoft.com/office/drawing/2014/main" id="{B616C74B-1A1C-4612-8D7A-608508876D6B}"/>
               </a:ext>
             </a:extLst>
           </p:cNvPr>
@@ -6762,7 +6754,7 @@
           <p:cNvPr id="4" name="Grafik 3">
             <a:extLst>
               <a:ext uri="{FF2B5EF4-FFF2-40B4-BE49-F238E27FC236}">
-                <a16:creationId xmlns:a16="http://schemas.microsoft.com/office/drawing/2014/main" xmlns="" id="{2F5448A5-105F-4C22-85A0-7C50C1DBA54C}"/>
+                <a16:creationId xmlns:a16="http://schemas.microsoft.com/office/drawing/2014/main" id="{2F5448A5-105F-4C22-85A0-7C50C1DBA54C}"/>
               </a:ext>
             </a:extLst>
           </p:cNvPr>
@@ -6798,7 +6790,7 @@
           <p:cNvPr id="7" name="Textfeld 6">
             <a:extLst>
               <a:ext uri="{FF2B5EF4-FFF2-40B4-BE49-F238E27FC236}">
-                <a16:creationId xmlns:a16="http://schemas.microsoft.com/office/drawing/2014/main" xmlns="" id="{2AB11AF8-E90B-4B4A-BE80-FE1C398D379A}"/>
+                <a16:creationId xmlns:a16="http://schemas.microsoft.com/office/drawing/2014/main" id="{2AB11AF8-E90B-4B4A-BE80-FE1C398D379A}"/>
               </a:ext>
             </a:extLst>
           </p:cNvPr>
@@ -6864,7 +6856,7 @@
           <p:cNvPr id="10" name="Foliennummernplatzhalter 9">
             <a:extLst>
               <a:ext uri="{FF2B5EF4-FFF2-40B4-BE49-F238E27FC236}">
-                <a16:creationId xmlns:a16="http://schemas.microsoft.com/office/drawing/2014/main" xmlns="" id="{D931436D-0B25-4BC2-AB85-D177B4C7ED90}"/>
+                <a16:creationId xmlns:a16="http://schemas.microsoft.com/office/drawing/2014/main" id="{D931436D-0B25-4BC2-AB85-D177B4C7ED90}"/>
               </a:ext>
             </a:extLst>
           </p:cNvPr>
@@ -6914,7 +6906,7 @@
           <p:cNvPr id="12" name="Gerader Verbinder 11">
             <a:extLst>
               <a:ext uri="{FF2B5EF4-FFF2-40B4-BE49-F238E27FC236}">
-                <a16:creationId xmlns:a16="http://schemas.microsoft.com/office/drawing/2014/main" xmlns="" id="{4A855513-E5C1-4F05-A8FD-33AC62C22A5E}"/>
+                <a16:creationId xmlns:a16="http://schemas.microsoft.com/office/drawing/2014/main" id="{4A855513-E5C1-4F05-A8FD-33AC62C22A5E}"/>
               </a:ext>
             </a:extLst>
           </p:cNvPr>
@@ -6955,7 +6947,7 @@
           <p:cNvPr id="13" name="Gerader Verbinder 12">
             <a:extLst>
               <a:ext uri="{FF2B5EF4-FFF2-40B4-BE49-F238E27FC236}">
-                <a16:creationId xmlns:a16="http://schemas.microsoft.com/office/drawing/2014/main" xmlns="" id="{F2778992-5E28-437C-AEA9-F9BBD6E6F5BB}"/>
+                <a16:creationId xmlns:a16="http://schemas.microsoft.com/office/drawing/2014/main" id="{F2778992-5E28-437C-AEA9-F9BBD6E6F5BB}"/>
               </a:ext>
             </a:extLst>
           </p:cNvPr>
@@ -6996,7 +6988,7 @@
           <p:cNvPr id="14" name="Textfeld 13">
             <a:extLst>
               <a:ext uri="{FF2B5EF4-FFF2-40B4-BE49-F238E27FC236}">
-                <a16:creationId xmlns:a16="http://schemas.microsoft.com/office/drawing/2014/main" xmlns="" id="{6CF8FF9D-8A98-4CFA-94C2-E2074112639C}"/>
+                <a16:creationId xmlns:a16="http://schemas.microsoft.com/office/drawing/2014/main" id="{6CF8FF9D-8A98-4CFA-94C2-E2074112639C}"/>
               </a:ext>
             </a:extLst>
           </p:cNvPr>
@@ -7032,7 +7024,7 @@
           <p:cNvPr id="6" name="Textfeld 5">
             <a:extLst>
               <a:ext uri="{FF2B5EF4-FFF2-40B4-BE49-F238E27FC236}">
-                <a16:creationId xmlns:a16="http://schemas.microsoft.com/office/drawing/2014/main" xmlns="" id="{8E05CB3E-FC8B-4C84-8452-A027AF29808D}"/>
+                <a16:creationId xmlns:a16="http://schemas.microsoft.com/office/drawing/2014/main" id="{8E05CB3E-FC8B-4C84-8452-A027AF29808D}"/>
               </a:ext>
             </a:extLst>
           </p:cNvPr>
@@ -7077,7 +7069,7 @@
           <p:cNvPr id="8" name="Textfeld 7">
             <a:extLst>
               <a:ext uri="{FF2B5EF4-FFF2-40B4-BE49-F238E27FC236}">
-                <a16:creationId xmlns:a16="http://schemas.microsoft.com/office/drawing/2014/main" xmlns="" id="{4842BEFA-10C3-45C0-8997-167BE0586DAC}"/>
+                <a16:creationId xmlns:a16="http://schemas.microsoft.com/office/drawing/2014/main" id="{4842BEFA-10C3-45C0-8997-167BE0586DAC}"/>
               </a:ext>
             </a:extLst>
           </p:cNvPr>
@@ -7220,7 +7212,7 @@
           <p:cNvPr id="3" name="Textfeld 2">
             <a:extLst>
               <a:ext uri="{FF2B5EF4-FFF2-40B4-BE49-F238E27FC236}">
-                <a16:creationId xmlns:a16="http://schemas.microsoft.com/office/drawing/2014/main" xmlns="" id="{B616C74B-1A1C-4612-8D7A-608508876D6B}"/>
+                <a16:creationId xmlns:a16="http://schemas.microsoft.com/office/drawing/2014/main" id="{B616C74B-1A1C-4612-8D7A-608508876D6B}"/>
               </a:ext>
             </a:extLst>
           </p:cNvPr>
@@ -7285,7 +7277,7 @@
           <p:cNvPr id="10" name="Foliennummernplatzhalter 9">
             <a:extLst>
               <a:ext uri="{FF2B5EF4-FFF2-40B4-BE49-F238E27FC236}">
-                <a16:creationId xmlns:a16="http://schemas.microsoft.com/office/drawing/2014/main" xmlns="" id="{D931436D-0B25-4BC2-AB85-D177B4C7ED90}"/>
+                <a16:creationId xmlns:a16="http://schemas.microsoft.com/office/drawing/2014/main" id="{D931436D-0B25-4BC2-AB85-D177B4C7ED90}"/>
               </a:ext>
             </a:extLst>
           </p:cNvPr>
@@ -7335,7 +7327,7 @@
           <p:cNvPr id="12" name="Gerader Verbinder 11">
             <a:extLst>
               <a:ext uri="{FF2B5EF4-FFF2-40B4-BE49-F238E27FC236}">
-                <a16:creationId xmlns:a16="http://schemas.microsoft.com/office/drawing/2014/main" xmlns="" id="{4A855513-E5C1-4F05-A8FD-33AC62C22A5E}"/>
+                <a16:creationId xmlns:a16="http://schemas.microsoft.com/office/drawing/2014/main" id="{4A855513-E5C1-4F05-A8FD-33AC62C22A5E}"/>
               </a:ext>
             </a:extLst>
           </p:cNvPr>
@@ -7376,7 +7368,7 @@
           <p:cNvPr id="13" name="Gerader Verbinder 12">
             <a:extLst>
               <a:ext uri="{FF2B5EF4-FFF2-40B4-BE49-F238E27FC236}">
-                <a16:creationId xmlns:a16="http://schemas.microsoft.com/office/drawing/2014/main" xmlns="" id="{F2778992-5E28-437C-AEA9-F9BBD6E6F5BB}"/>
+                <a16:creationId xmlns:a16="http://schemas.microsoft.com/office/drawing/2014/main" id="{F2778992-5E28-437C-AEA9-F9BBD6E6F5BB}"/>
               </a:ext>
             </a:extLst>
           </p:cNvPr>
@@ -7417,7 +7409,7 @@
           <p:cNvPr id="14" name="Textfeld 13">
             <a:extLst>
               <a:ext uri="{FF2B5EF4-FFF2-40B4-BE49-F238E27FC236}">
-                <a16:creationId xmlns:a16="http://schemas.microsoft.com/office/drawing/2014/main" xmlns="" id="{6CF8FF9D-8A98-4CFA-94C2-E2074112639C}"/>
+                <a16:creationId xmlns:a16="http://schemas.microsoft.com/office/drawing/2014/main" id="{6CF8FF9D-8A98-4CFA-94C2-E2074112639C}"/>
               </a:ext>
             </a:extLst>
           </p:cNvPr>
@@ -7453,7 +7445,7 @@
           <p:cNvPr id="6" name="Textfeld 5">
             <a:extLst>
               <a:ext uri="{FF2B5EF4-FFF2-40B4-BE49-F238E27FC236}">
-                <a16:creationId xmlns:a16="http://schemas.microsoft.com/office/drawing/2014/main" xmlns="" id="{8E05CB3E-FC8B-4C84-8452-A027AF29808D}"/>
+                <a16:creationId xmlns:a16="http://schemas.microsoft.com/office/drawing/2014/main" id="{8E05CB3E-FC8B-4C84-8452-A027AF29808D}"/>
               </a:ext>
             </a:extLst>
           </p:cNvPr>
@@ -7498,7 +7490,7 @@
           <p:cNvPr id="3" name="Textfeld 2">
             <a:extLst>
               <a:ext uri="{FF2B5EF4-FFF2-40B4-BE49-F238E27FC236}">
-                <a16:creationId xmlns:a16="http://schemas.microsoft.com/office/drawing/2014/main" xmlns="" id="{B616C74B-1A1C-4612-8D7A-608508876D6B}"/>
+                <a16:creationId xmlns:a16="http://schemas.microsoft.com/office/drawing/2014/main" id="{B616C74B-1A1C-4612-8D7A-608508876D6B}"/>
               </a:ext>
             </a:extLst>
           </p:cNvPr>
@@ -7533,7 +7525,7 @@
           <p:cNvPr id="4" name="Grafik 3">
             <a:extLst>
               <a:ext uri="{FF2B5EF4-FFF2-40B4-BE49-F238E27FC236}">
-                <a16:creationId xmlns:a16="http://schemas.microsoft.com/office/drawing/2014/main" xmlns="" id="{FA2D8E22-F62E-4F78-B108-253534630D75}"/>
+                <a16:creationId xmlns:a16="http://schemas.microsoft.com/office/drawing/2014/main" id="{FA2D8E22-F62E-4F78-B108-253534630D75}"/>
               </a:ext>
             </a:extLst>
           </p:cNvPr>
@@ -7593,7 +7585,7 @@
           <p:cNvPr id="10" name="Foliennummernplatzhalter 9">
             <a:extLst>
               <a:ext uri="{FF2B5EF4-FFF2-40B4-BE49-F238E27FC236}">
-                <a16:creationId xmlns:a16="http://schemas.microsoft.com/office/drawing/2014/main" xmlns="" id="{D931436D-0B25-4BC2-AB85-D177B4C7ED90}"/>
+                <a16:creationId xmlns:a16="http://schemas.microsoft.com/office/drawing/2014/main" id="{D931436D-0B25-4BC2-AB85-D177B4C7ED90}"/>
               </a:ext>
             </a:extLst>
           </p:cNvPr>
@@ -7643,7 +7635,7 @@
           <p:cNvPr id="12" name="Gerader Verbinder 11">
             <a:extLst>
               <a:ext uri="{FF2B5EF4-FFF2-40B4-BE49-F238E27FC236}">
-                <a16:creationId xmlns:a16="http://schemas.microsoft.com/office/drawing/2014/main" xmlns="" id="{4A855513-E5C1-4F05-A8FD-33AC62C22A5E}"/>
+                <a16:creationId xmlns:a16="http://schemas.microsoft.com/office/drawing/2014/main" id="{4A855513-E5C1-4F05-A8FD-33AC62C22A5E}"/>
               </a:ext>
             </a:extLst>
           </p:cNvPr>
@@ -7684,7 +7676,7 @@
           <p:cNvPr id="13" name="Gerader Verbinder 12">
             <a:extLst>
               <a:ext uri="{FF2B5EF4-FFF2-40B4-BE49-F238E27FC236}">
-                <a16:creationId xmlns:a16="http://schemas.microsoft.com/office/drawing/2014/main" xmlns="" id="{F2778992-5E28-437C-AEA9-F9BBD6E6F5BB}"/>
+                <a16:creationId xmlns:a16="http://schemas.microsoft.com/office/drawing/2014/main" id="{F2778992-5E28-437C-AEA9-F9BBD6E6F5BB}"/>
               </a:ext>
             </a:extLst>
           </p:cNvPr>
@@ -7725,7 +7717,7 @@
           <p:cNvPr id="14" name="Textfeld 13">
             <a:extLst>
               <a:ext uri="{FF2B5EF4-FFF2-40B4-BE49-F238E27FC236}">
-                <a16:creationId xmlns:a16="http://schemas.microsoft.com/office/drawing/2014/main" xmlns="" id="{6CF8FF9D-8A98-4CFA-94C2-E2074112639C}"/>
+                <a16:creationId xmlns:a16="http://schemas.microsoft.com/office/drawing/2014/main" id="{6CF8FF9D-8A98-4CFA-94C2-E2074112639C}"/>
               </a:ext>
             </a:extLst>
           </p:cNvPr>
@@ -7761,7 +7753,7 @@
           <p:cNvPr id="6" name="Textfeld 5">
             <a:extLst>
               <a:ext uri="{FF2B5EF4-FFF2-40B4-BE49-F238E27FC236}">
-                <a16:creationId xmlns:a16="http://schemas.microsoft.com/office/drawing/2014/main" xmlns="" id="{8E05CB3E-FC8B-4C84-8452-A027AF29808D}"/>
+                <a16:creationId xmlns:a16="http://schemas.microsoft.com/office/drawing/2014/main" id="{8E05CB3E-FC8B-4C84-8452-A027AF29808D}"/>
               </a:ext>
             </a:extLst>
           </p:cNvPr>
@@ -7806,7 +7798,7 @@
           <p:cNvPr id="3" name="Textfeld 2">
             <a:extLst>
               <a:ext uri="{FF2B5EF4-FFF2-40B4-BE49-F238E27FC236}">
-                <a16:creationId xmlns:a16="http://schemas.microsoft.com/office/drawing/2014/main" xmlns="" id="{B616C74B-1A1C-4612-8D7A-608508876D6B}"/>
+                <a16:creationId xmlns:a16="http://schemas.microsoft.com/office/drawing/2014/main" id="{B616C74B-1A1C-4612-8D7A-608508876D6B}"/>
               </a:ext>
             </a:extLst>
           </p:cNvPr>
@@ -7841,7 +7833,7 @@
           <p:cNvPr id="15" name="Textfeld 14">
             <a:extLst>
               <a:ext uri="{FF2B5EF4-FFF2-40B4-BE49-F238E27FC236}">
-                <a16:creationId xmlns:a16="http://schemas.microsoft.com/office/drawing/2014/main" xmlns="" id="{79F52149-1009-4870-BA4B-79BC8D3BBE17}"/>
+                <a16:creationId xmlns:a16="http://schemas.microsoft.com/office/drawing/2014/main" id="{79F52149-1009-4870-BA4B-79BC8D3BBE17}"/>
               </a:ext>
             </a:extLst>
           </p:cNvPr>
@@ -8802,7 +8794,7 @@
           <p:cNvPr id="10" name="Foliennummernplatzhalter 9">
             <a:extLst>
               <a:ext uri="{FF2B5EF4-FFF2-40B4-BE49-F238E27FC236}">
-                <a16:creationId xmlns:a16="http://schemas.microsoft.com/office/drawing/2014/main" xmlns="" id="{D931436D-0B25-4BC2-AB85-D177B4C7ED90}"/>
+                <a16:creationId xmlns:a16="http://schemas.microsoft.com/office/drawing/2014/main" id="{D931436D-0B25-4BC2-AB85-D177B4C7ED90}"/>
               </a:ext>
             </a:extLst>
           </p:cNvPr>
@@ -8852,7 +8844,7 @@
           <p:cNvPr id="12" name="Gerader Verbinder 11">
             <a:extLst>
               <a:ext uri="{FF2B5EF4-FFF2-40B4-BE49-F238E27FC236}">
-                <a16:creationId xmlns:a16="http://schemas.microsoft.com/office/drawing/2014/main" xmlns="" id="{4A855513-E5C1-4F05-A8FD-33AC62C22A5E}"/>
+                <a16:creationId xmlns:a16="http://schemas.microsoft.com/office/drawing/2014/main" id="{4A855513-E5C1-4F05-A8FD-33AC62C22A5E}"/>
               </a:ext>
             </a:extLst>
           </p:cNvPr>
@@ -8893,7 +8885,7 @@
           <p:cNvPr id="13" name="Gerader Verbinder 12">
             <a:extLst>
               <a:ext uri="{FF2B5EF4-FFF2-40B4-BE49-F238E27FC236}">
-                <a16:creationId xmlns:a16="http://schemas.microsoft.com/office/drawing/2014/main" xmlns="" id="{F2778992-5E28-437C-AEA9-F9BBD6E6F5BB}"/>
+                <a16:creationId xmlns:a16="http://schemas.microsoft.com/office/drawing/2014/main" id="{F2778992-5E28-437C-AEA9-F9BBD6E6F5BB}"/>
               </a:ext>
             </a:extLst>
           </p:cNvPr>
@@ -8934,7 +8926,7 @@
           <p:cNvPr id="14" name="Textfeld 13">
             <a:extLst>
               <a:ext uri="{FF2B5EF4-FFF2-40B4-BE49-F238E27FC236}">
-                <a16:creationId xmlns:a16="http://schemas.microsoft.com/office/drawing/2014/main" xmlns="" id="{6CF8FF9D-8A98-4CFA-94C2-E2074112639C}"/>
+                <a16:creationId xmlns:a16="http://schemas.microsoft.com/office/drawing/2014/main" id="{6CF8FF9D-8A98-4CFA-94C2-E2074112639C}"/>
               </a:ext>
             </a:extLst>
           </p:cNvPr>
@@ -8970,7 +8962,7 @@
           <p:cNvPr id="6" name="Textfeld 5">
             <a:extLst>
               <a:ext uri="{FF2B5EF4-FFF2-40B4-BE49-F238E27FC236}">
-                <a16:creationId xmlns:a16="http://schemas.microsoft.com/office/drawing/2014/main" xmlns="" id="{8E05CB3E-FC8B-4C84-8452-A027AF29808D}"/>
+                <a16:creationId xmlns:a16="http://schemas.microsoft.com/office/drawing/2014/main" id="{8E05CB3E-FC8B-4C84-8452-A027AF29808D}"/>
               </a:ext>
             </a:extLst>
           </p:cNvPr>
@@ -9015,7 +9007,7 @@
           <p:cNvPr id="3" name="Textfeld 2">
             <a:extLst>
               <a:ext uri="{FF2B5EF4-FFF2-40B4-BE49-F238E27FC236}">
-                <a16:creationId xmlns:a16="http://schemas.microsoft.com/office/drawing/2014/main" xmlns="" id="{B616C74B-1A1C-4612-8D7A-608508876D6B}"/>
+                <a16:creationId xmlns:a16="http://schemas.microsoft.com/office/drawing/2014/main" id="{B616C74B-1A1C-4612-8D7A-608508876D6B}"/>
               </a:ext>
             </a:extLst>
           </p:cNvPr>
@@ -9050,7 +9042,7 @@
           <p:cNvPr id="15" name="Textfeld 14">
             <a:extLst>
               <a:ext uri="{FF2B5EF4-FFF2-40B4-BE49-F238E27FC236}">
-                <a16:creationId xmlns:a16="http://schemas.microsoft.com/office/drawing/2014/main" xmlns="" id="{79F52149-1009-4870-BA4B-79BC8D3BBE17}"/>
+                <a16:creationId xmlns:a16="http://schemas.microsoft.com/office/drawing/2014/main" id="{79F52149-1009-4870-BA4B-79BC8D3BBE17}"/>
               </a:ext>
             </a:extLst>
           </p:cNvPr>
@@ -9489,7 +9481,7 @@
           <p:cNvPr id="10" name="Foliennummernplatzhalter 9">
             <a:extLst>
               <a:ext uri="{FF2B5EF4-FFF2-40B4-BE49-F238E27FC236}">
-                <a16:creationId xmlns:a16="http://schemas.microsoft.com/office/drawing/2014/main" xmlns="" id="{D931436D-0B25-4BC2-AB85-D177B4C7ED90}"/>
+                <a16:creationId xmlns:a16="http://schemas.microsoft.com/office/drawing/2014/main" id="{D931436D-0B25-4BC2-AB85-D177B4C7ED90}"/>
               </a:ext>
             </a:extLst>
           </p:cNvPr>
@@ -9539,7 +9531,7 @@
           <p:cNvPr id="12" name="Gerader Verbinder 11">
             <a:extLst>
               <a:ext uri="{FF2B5EF4-FFF2-40B4-BE49-F238E27FC236}">
-                <a16:creationId xmlns:a16="http://schemas.microsoft.com/office/drawing/2014/main" xmlns="" id="{4A855513-E5C1-4F05-A8FD-33AC62C22A5E}"/>
+                <a16:creationId xmlns:a16="http://schemas.microsoft.com/office/drawing/2014/main" id="{4A855513-E5C1-4F05-A8FD-33AC62C22A5E}"/>
               </a:ext>
             </a:extLst>
           </p:cNvPr>
@@ -9580,7 +9572,7 @@
           <p:cNvPr id="13" name="Gerader Verbinder 12">
             <a:extLst>
               <a:ext uri="{FF2B5EF4-FFF2-40B4-BE49-F238E27FC236}">
-                <a16:creationId xmlns:a16="http://schemas.microsoft.com/office/drawing/2014/main" xmlns="" id="{F2778992-5E28-437C-AEA9-F9BBD6E6F5BB}"/>
+                <a16:creationId xmlns:a16="http://schemas.microsoft.com/office/drawing/2014/main" id="{F2778992-5E28-437C-AEA9-F9BBD6E6F5BB}"/>
               </a:ext>
             </a:extLst>
           </p:cNvPr>
@@ -9621,7 +9613,7 @@
           <p:cNvPr id="14" name="Textfeld 13">
             <a:extLst>
               <a:ext uri="{FF2B5EF4-FFF2-40B4-BE49-F238E27FC236}">
-                <a16:creationId xmlns:a16="http://schemas.microsoft.com/office/drawing/2014/main" xmlns="" id="{6CF8FF9D-8A98-4CFA-94C2-E2074112639C}"/>
+                <a16:creationId xmlns:a16="http://schemas.microsoft.com/office/drawing/2014/main" id="{6CF8FF9D-8A98-4CFA-94C2-E2074112639C}"/>
               </a:ext>
             </a:extLst>
           </p:cNvPr>
@@ -9687,7 +9679,7 @@
           <p:cNvPr id="8" name="Textfeld 7">
             <a:extLst>
               <a:ext uri="{FF2B5EF4-FFF2-40B4-BE49-F238E27FC236}">
-                <a16:creationId xmlns:a16="http://schemas.microsoft.com/office/drawing/2014/main" xmlns="" id="{8E05CB3E-FC8B-4C84-8452-A027AF29808D}"/>
+                <a16:creationId xmlns:a16="http://schemas.microsoft.com/office/drawing/2014/main" id="{8E05CB3E-FC8B-4C84-8452-A027AF29808D}"/>
               </a:ext>
             </a:extLst>
           </p:cNvPr>
@@ -9812,7 +9804,7 @@
           <p:cNvPr id="10" name="Foliennummernplatzhalter 9">
             <a:extLst>
               <a:ext uri="{FF2B5EF4-FFF2-40B4-BE49-F238E27FC236}">
-                <a16:creationId xmlns:a16="http://schemas.microsoft.com/office/drawing/2014/main" xmlns="" id="{D931436D-0B25-4BC2-AB85-D177B4C7ED90}"/>
+                <a16:creationId xmlns:a16="http://schemas.microsoft.com/office/drawing/2014/main" id="{D931436D-0B25-4BC2-AB85-D177B4C7ED90}"/>
               </a:ext>
             </a:extLst>
           </p:cNvPr>
@@ -9862,7 +9854,7 @@
           <p:cNvPr id="12" name="Gerader Verbinder 11">
             <a:extLst>
               <a:ext uri="{FF2B5EF4-FFF2-40B4-BE49-F238E27FC236}">
-                <a16:creationId xmlns:a16="http://schemas.microsoft.com/office/drawing/2014/main" xmlns="" id="{4A855513-E5C1-4F05-A8FD-33AC62C22A5E}"/>
+                <a16:creationId xmlns:a16="http://schemas.microsoft.com/office/drawing/2014/main" id="{4A855513-E5C1-4F05-A8FD-33AC62C22A5E}"/>
               </a:ext>
             </a:extLst>
           </p:cNvPr>
@@ -9903,7 +9895,7 @@
           <p:cNvPr id="13" name="Gerader Verbinder 12">
             <a:extLst>
               <a:ext uri="{FF2B5EF4-FFF2-40B4-BE49-F238E27FC236}">
-                <a16:creationId xmlns:a16="http://schemas.microsoft.com/office/drawing/2014/main" xmlns="" id="{F2778992-5E28-437C-AEA9-F9BBD6E6F5BB}"/>
+                <a16:creationId xmlns:a16="http://schemas.microsoft.com/office/drawing/2014/main" id="{F2778992-5E28-437C-AEA9-F9BBD6E6F5BB}"/>
               </a:ext>
             </a:extLst>
           </p:cNvPr>
@@ -9944,7 +9936,7 @@
           <p:cNvPr id="14" name="Textfeld 13">
             <a:extLst>
               <a:ext uri="{FF2B5EF4-FFF2-40B4-BE49-F238E27FC236}">
-                <a16:creationId xmlns:a16="http://schemas.microsoft.com/office/drawing/2014/main" xmlns="" id="{6CF8FF9D-8A98-4CFA-94C2-E2074112639C}"/>
+                <a16:creationId xmlns:a16="http://schemas.microsoft.com/office/drawing/2014/main" id="{6CF8FF9D-8A98-4CFA-94C2-E2074112639C}"/>
               </a:ext>
             </a:extLst>
           </p:cNvPr>
@@ -9980,7 +9972,7 @@
           <p:cNvPr id="6" name="Textfeld 5">
             <a:extLst>
               <a:ext uri="{FF2B5EF4-FFF2-40B4-BE49-F238E27FC236}">
-                <a16:creationId xmlns:a16="http://schemas.microsoft.com/office/drawing/2014/main" xmlns="" id="{8E05CB3E-FC8B-4C84-8452-A027AF29808D}"/>
+                <a16:creationId xmlns:a16="http://schemas.microsoft.com/office/drawing/2014/main" id="{8E05CB3E-FC8B-4C84-8452-A027AF29808D}"/>
               </a:ext>
             </a:extLst>
           </p:cNvPr>
@@ -10078,28 +10070,28 @@
                 <a:gridCol w="1089020">
                   <a:extLst>
                     <a:ext uri="{9D8B030D-6E8A-4147-A177-3AD203B41FA5}">
-                      <a16:colId xmlns:a16="http://schemas.microsoft.com/office/drawing/2014/main" xmlns="" val="20000"/>
+                      <a16:colId xmlns:a16="http://schemas.microsoft.com/office/drawing/2014/main" val="20000"/>
                     </a:ext>
                   </a:extLst>
                 </a:gridCol>
                 <a:gridCol w="996778">
                   <a:extLst>
                     <a:ext uri="{9D8B030D-6E8A-4147-A177-3AD203B41FA5}">
-                      <a16:colId xmlns:a16="http://schemas.microsoft.com/office/drawing/2014/main" xmlns="" val="20001"/>
+                      <a16:colId xmlns:a16="http://schemas.microsoft.com/office/drawing/2014/main" val="20001"/>
                     </a:ext>
                   </a:extLst>
                 </a:gridCol>
                 <a:gridCol w="2075935">
                   <a:extLst>
                     <a:ext uri="{9D8B030D-6E8A-4147-A177-3AD203B41FA5}">
-                      <a16:colId xmlns:a16="http://schemas.microsoft.com/office/drawing/2014/main" xmlns="" val="20002"/>
+                      <a16:colId xmlns:a16="http://schemas.microsoft.com/office/drawing/2014/main" val="20002"/>
                     </a:ext>
                   </a:extLst>
                 </a:gridCol>
                 <a:gridCol w="2314833">
                   <a:extLst>
                     <a:ext uri="{9D8B030D-6E8A-4147-A177-3AD203B41FA5}">
-                      <a16:colId xmlns:a16="http://schemas.microsoft.com/office/drawing/2014/main" xmlns="" val="20003"/>
+                      <a16:colId xmlns:a16="http://schemas.microsoft.com/office/drawing/2014/main" val="20003"/>
                     </a:ext>
                   </a:extLst>
                 </a:gridCol>
@@ -10235,7 +10227,7 @@
                 </a:tc>
                 <a:extLst>
                   <a:ext uri="{0D108BD9-81ED-4DB2-BD59-A6C34878D82A}">
-                    <a16:rowId xmlns:a16="http://schemas.microsoft.com/office/drawing/2014/main" xmlns="" val="10000"/>
+                    <a16:rowId xmlns:a16="http://schemas.microsoft.com/office/drawing/2014/main" val="10000"/>
                   </a:ext>
                 </a:extLst>
               </a:tr>
@@ -10389,7 +10381,7 @@
                 </a:tc>
                 <a:extLst>
                   <a:ext uri="{0D108BD9-81ED-4DB2-BD59-A6C34878D82A}">
-                    <a16:rowId xmlns:a16="http://schemas.microsoft.com/office/drawing/2014/main" xmlns="" val="10001"/>
+                    <a16:rowId xmlns:a16="http://schemas.microsoft.com/office/drawing/2014/main" val="10001"/>
                   </a:ext>
                 </a:extLst>
               </a:tr>
@@ -10512,7 +10504,7 @@
                 </a:tc>
                 <a:extLst>
                   <a:ext uri="{0D108BD9-81ED-4DB2-BD59-A6C34878D82A}">
-                    <a16:rowId xmlns:a16="http://schemas.microsoft.com/office/drawing/2014/main" xmlns="" val="10002"/>
+                    <a16:rowId xmlns:a16="http://schemas.microsoft.com/office/drawing/2014/main" val="10002"/>
                   </a:ext>
                 </a:extLst>
               </a:tr>
@@ -10648,7 +10640,7 @@
                 </a:tc>
                 <a:extLst>
                   <a:ext uri="{0D108BD9-81ED-4DB2-BD59-A6C34878D82A}">
-                    <a16:rowId xmlns:a16="http://schemas.microsoft.com/office/drawing/2014/main" xmlns="" val="10003"/>
+                    <a16:rowId xmlns:a16="http://schemas.microsoft.com/office/drawing/2014/main" val="10003"/>
                   </a:ext>
                 </a:extLst>
               </a:tr>
@@ -10829,7 +10821,7 @@
                 </a:tc>
                 <a:extLst>
                   <a:ext uri="{0D108BD9-81ED-4DB2-BD59-A6C34878D82A}">
-                    <a16:rowId xmlns:a16="http://schemas.microsoft.com/office/drawing/2014/main" xmlns="" val="10004"/>
+                    <a16:rowId xmlns:a16="http://schemas.microsoft.com/office/drawing/2014/main" val="10004"/>
                   </a:ext>
                 </a:extLst>
               </a:tr>
@@ -10872,7 +10864,7 @@
           <p:cNvPr id="10" name="Foliennummernplatzhalter 9">
             <a:extLst>
               <a:ext uri="{FF2B5EF4-FFF2-40B4-BE49-F238E27FC236}">
-                <a16:creationId xmlns:a16="http://schemas.microsoft.com/office/drawing/2014/main" xmlns="" id="{D931436D-0B25-4BC2-AB85-D177B4C7ED90}"/>
+                <a16:creationId xmlns:a16="http://schemas.microsoft.com/office/drawing/2014/main" id="{D931436D-0B25-4BC2-AB85-D177B4C7ED90}"/>
               </a:ext>
             </a:extLst>
           </p:cNvPr>
@@ -10922,7 +10914,7 @@
           <p:cNvPr id="12" name="Gerader Verbinder 11">
             <a:extLst>
               <a:ext uri="{FF2B5EF4-FFF2-40B4-BE49-F238E27FC236}">
-                <a16:creationId xmlns:a16="http://schemas.microsoft.com/office/drawing/2014/main" xmlns="" id="{4A855513-E5C1-4F05-A8FD-33AC62C22A5E}"/>
+                <a16:creationId xmlns:a16="http://schemas.microsoft.com/office/drawing/2014/main" id="{4A855513-E5C1-4F05-A8FD-33AC62C22A5E}"/>
               </a:ext>
             </a:extLst>
           </p:cNvPr>
@@ -10963,7 +10955,7 @@
           <p:cNvPr id="13" name="Gerader Verbinder 12">
             <a:extLst>
               <a:ext uri="{FF2B5EF4-FFF2-40B4-BE49-F238E27FC236}">
-                <a16:creationId xmlns:a16="http://schemas.microsoft.com/office/drawing/2014/main" xmlns="" id="{F2778992-5E28-437C-AEA9-F9BBD6E6F5BB}"/>
+                <a16:creationId xmlns:a16="http://schemas.microsoft.com/office/drawing/2014/main" id="{F2778992-5E28-437C-AEA9-F9BBD6E6F5BB}"/>
               </a:ext>
             </a:extLst>
           </p:cNvPr>
@@ -11004,7 +10996,7 @@
           <p:cNvPr id="14" name="Textfeld 13">
             <a:extLst>
               <a:ext uri="{FF2B5EF4-FFF2-40B4-BE49-F238E27FC236}">
-                <a16:creationId xmlns:a16="http://schemas.microsoft.com/office/drawing/2014/main" xmlns="" id="{6CF8FF9D-8A98-4CFA-94C2-E2074112639C}"/>
+                <a16:creationId xmlns:a16="http://schemas.microsoft.com/office/drawing/2014/main" id="{6CF8FF9D-8A98-4CFA-94C2-E2074112639C}"/>
               </a:ext>
             </a:extLst>
           </p:cNvPr>
@@ -11040,7 +11032,7 @@
           <p:cNvPr id="15" name="Textfeld 14">
             <a:extLst>
               <a:ext uri="{FF2B5EF4-FFF2-40B4-BE49-F238E27FC236}">
-                <a16:creationId xmlns:a16="http://schemas.microsoft.com/office/drawing/2014/main" xmlns="" id="{DD417980-0DD8-4DD7-BE87-C974912B8B82}"/>
+                <a16:creationId xmlns:a16="http://schemas.microsoft.com/office/drawing/2014/main" id="{DD417980-0DD8-4DD7-BE87-C974912B8B82}"/>
               </a:ext>
             </a:extLst>
           </p:cNvPr>
@@ -11075,7 +11067,7 @@
           <p:cNvPr id="17" name="Textfeld 16">
             <a:extLst>
               <a:ext uri="{FF2B5EF4-FFF2-40B4-BE49-F238E27FC236}">
-                <a16:creationId xmlns:a16="http://schemas.microsoft.com/office/drawing/2014/main" xmlns="" id="{BCB027A4-8BDB-4515-B3E5-91B6A22A1E00}"/>
+                <a16:creationId xmlns:a16="http://schemas.microsoft.com/office/drawing/2014/main" id="{BCB027A4-8BDB-4515-B3E5-91B6A22A1E00}"/>
               </a:ext>
             </a:extLst>
           </p:cNvPr>
@@ -11164,7 +11156,7 @@
           <p:cNvPr id="19" name="Textfeld 18">
             <a:extLst>
               <a:ext uri="{FF2B5EF4-FFF2-40B4-BE49-F238E27FC236}">
-                <a16:creationId xmlns:a16="http://schemas.microsoft.com/office/drawing/2014/main" xmlns="" id="{C814F180-BEAD-4EF5-9E52-0A793EAC896B}"/>
+                <a16:creationId xmlns:a16="http://schemas.microsoft.com/office/drawing/2014/main" id="{C814F180-BEAD-4EF5-9E52-0A793EAC896B}"/>
               </a:ext>
             </a:extLst>
           </p:cNvPr>
@@ -11204,7 +11196,7 @@
           <p:cNvPr id="21" name="Textfeld 20">
             <a:extLst>
               <a:ext uri="{FF2B5EF4-FFF2-40B4-BE49-F238E27FC236}">
-                <a16:creationId xmlns:a16="http://schemas.microsoft.com/office/drawing/2014/main" xmlns="" id="{57069215-89D3-4945-A74E-2B00B8E15F6C}"/>
+                <a16:creationId xmlns:a16="http://schemas.microsoft.com/office/drawing/2014/main" id="{57069215-89D3-4945-A74E-2B00B8E15F6C}"/>
               </a:ext>
             </a:extLst>
           </p:cNvPr>
@@ -11369,7 +11361,7 @@
           <p:cNvPr id="10" name="Foliennummernplatzhalter 9">
             <a:extLst>
               <a:ext uri="{FF2B5EF4-FFF2-40B4-BE49-F238E27FC236}">
-                <a16:creationId xmlns:a16="http://schemas.microsoft.com/office/drawing/2014/main" xmlns="" id="{D931436D-0B25-4BC2-AB85-D177B4C7ED90}"/>
+                <a16:creationId xmlns:a16="http://schemas.microsoft.com/office/drawing/2014/main" id="{D931436D-0B25-4BC2-AB85-D177B4C7ED90}"/>
               </a:ext>
             </a:extLst>
           </p:cNvPr>
@@ -11419,7 +11411,7 @@
           <p:cNvPr id="12" name="Gerader Verbinder 11">
             <a:extLst>
               <a:ext uri="{FF2B5EF4-FFF2-40B4-BE49-F238E27FC236}">
-                <a16:creationId xmlns:a16="http://schemas.microsoft.com/office/drawing/2014/main" xmlns="" id="{4A855513-E5C1-4F05-A8FD-33AC62C22A5E}"/>
+                <a16:creationId xmlns:a16="http://schemas.microsoft.com/office/drawing/2014/main" id="{4A855513-E5C1-4F05-A8FD-33AC62C22A5E}"/>
               </a:ext>
             </a:extLst>
           </p:cNvPr>
@@ -11460,7 +11452,7 @@
           <p:cNvPr id="13" name="Gerader Verbinder 12">
             <a:extLst>
               <a:ext uri="{FF2B5EF4-FFF2-40B4-BE49-F238E27FC236}">
-                <a16:creationId xmlns:a16="http://schemas.microsoft.com/office/drawing/2014/main" xmlns="" id="{F2778992-5E28-437C-AEA9-F9BBD6E6F5BB}"/>
+                <a16:creationId xmlns:a16="http://schemas.microsoft.com/office/drawing/2014/main" id="{F2778992-5E28-437C-AEA9-F9BBD6E6F5BB}"/>
               </a:ext>
             </a:extLst>
           </p:cNvPr>
@@ -11501,7 +11493,7 @@
           <p:cNvPr id="14" name="Textfeld 13">
             <a:extLst>
               <a:ext uri="{FF2B5EF4-FFF2-40B4-BE49-F238E27FC236}">
-                <a16:creationId xmlns:a16="http://schemas.microsoft.com/office/drawing/2014/main" xmlns="" id="{6CF8FF9D-8A98-4CFA-94C2-E2074112639C}"/>
+                <a16:creationId xmlns:a16="http://schemas.microsoft.com/office/drawing/2014/main" id="{6CF8FF9D-8A98-4CFA-94C2-E2074112639C}"/>
               </a:ext>
             </a:extLst>
           </p:cNvPr>
@@ -11567,7 +11559,7 @@
           <p:cNvPr id="8" name="Textfeld 7">
             <a:extLst>
               <a:ext uri="{FF2B5EF4-FFF2-40B4-BE49-F238E27FC236}">
-                <a16:creationId xmlns:a16="http://schemas.microsoft.com/office/drawing/2014/main" xmlns="" id="{8E05CB3E-FC8B-4C84-8452-A027AF29808D}"/>
+                <a16:creationId xmlns:a16="http://schemas.microsoft.com/office/drawing/2014/main" id="{8E05CB3E-FC8B-4C84-8452-A027AF29808D}"/>
               </a:ext>
             </a:extLst>
           </p:cNvPr>
@@ -11633,10 +11625,6 @@
               <a:rPr lang="de-DE" dirty="0"/>
               <a:t>Daten werden in einer Liste gespeichert, der älteste Wert wird hier entnommen. First in First out </a:t>
             </a:r>
-            <a:r>
-              <a:rPr lang="de-DE" dirty="0"/>
-              <a:t/>
-            </a:r>
             <a:br>
               <a:rPr lang="de-DE" dirty="0"/>
             </a:br>
@@ -11644,34 +11632,12 @@
               <a:rPr lang="de-DE" dirty="0"/>
               <a:t>(FIFO). Da Daten von Vorne entnommen werden entsteht ungenutzter Speicher. </a:t>
             </a:r>
-            <a:endParaRPr lang="de-DE" dirty="0" smtClean="0"/>
-          </a:p>
-          <a:p>
-            <a:r>
-              <a:rPr lang="de-DE" dirty="0" smtClean="0"/>
-              <a:t>Hier </a:t>
-            </a:r>
+          </a:p>
+          <a:p>
             <a:r>
               <a:rPr lang="de-DE" dirty="0"/>
-              <a:t>ist zu Achten, </a:t>
-            </a:r>
-            <a:r>
-              <a:rPr lang="de-DE" dirty="0" smtClean="0"/>
-              <a:t>dass </a:t>
-            </a:r>
-            <a:r>
-              <a:rPr lang="de-DE" dirty="0"/>
-              <a:t>dieser Speicher möglichst freigegeben wird, natürlich ist eine umbauen des Speichers bei jedem </a:t>
-            </a:r>
-            <a:r>
-              <a:rPr lang="de-DE" dirty="0" smtClean="0"/>
-              <a:t>Zugriff </a:t>
-            </a:r>
-            <a:r>
-              <a:rPr lang="de-DE" dirty="0"/>
-              <a:t>nicht unbedingt Sinnvoll.</a:t>
-            </a:r>
-            <a:endParaRPr lang="de-DE" dirty="0"/>
+              <a:t>Hier ist zu Achten, dass dieser Speicher möglichst freigegeben wird, natürlich ist eine umbauen des Speichers bei jedem Zugriff nicht unbedingt Sinnvoll.</a:t>
+            </a:r>
           </a:p>
         </p:txBody>
       </p:sp>
@@ -11710,7 +11676,7 @@
           <p:cNvPr id="10" name="Foliennummernplatzhalter 9">
             <a:extLst>
               <a:ext uri="{FF2B5EF4-FFF2-40B4-BE49-F238E27FC236}">
-                <a16:creationId xmlns:a16="http://schemas.microsoft.com/office/drawing/2014/main" xmlns="" id="{D931436D-0B25-4BC2-AB85-D177B4C7ED90}"/>
+                <a16:creationId xmlns:a16="http://schemas.microsoft.com/office/drawing/2014/main" id="{D931436D-0B25-4BC2-AB85-D177B4C7ED90}"/>
               </a:ext>
             </a:extLst>
           </p:cNvPr>
@@ -11760,7 +11726,7 @@
           <p:cNvPr id="12" name="Gerader Verbinder 11">
             <a:extLst>
               <a:ext uri="{FF2B5EF4-FFF2-40B4-BE49-F238E27FC236}">
-                <a16:creationId xmlns:a16="http://schemas.microsoft.com/office/drawing/2014/main" xmlns="" id="{4A855513-E5C1-4F05-A8FD-33AC62C22A5E}"/>
+                <a16:creationId xmlns:a16="http://schemas.microsoft.com/office/drawing/2014/main" id="{4A855513-E5C1-4F05-A8FD-33AC62C22A5E}"/>
               </a:ext>
             </a:extLst>
           </p:cNvPr>
@@ -11801,7 +11767,7 @@
           <p:cNvPr id="13" name="Gerader Verbinder 12">
             <a:extLst>
               <a:ext uri="{FF2B5EF4-FFF2-40B4-BE49-F238E27FC236}">
-                <a16:creationId xmlns:a16="http://schemas.microsoft.com/office/drawing/2014/main" xmlns="" id="{F2778992-5E28-437C-AEA9-F9BBD6E6F5BB}"/>
+                <a16:creationId xmlns:a16="http://schemas.microsoft.com/office/drawing/2014/main" id="{F2778992-5E28-437C-AEA9-F9BBD6E6F5BB}"/>
               </a:ext>
             </a:extLst>
           </p:cNvPr>
@@ -11842,7 +11808,7 @@
           <p:cNvPr id="14" name="Textfeld 13">
             <a:extLst>
               <a:ext uri="{FF2B5EF4-FFF2-40B4-BE49-F238E27FC236}">
-                <a16:creationId xmlns:a16="http://schemas.microsoft.com/office/drawing/2014/main" xmlns="" id="{6CF8FF9D-8A98-4CFA-94C2-E2074112639C}"/>
+                <a16:creationId xmlns:a16="http://schemas.microsoft.com/office/drawing/2014/main" id="{6CF8FF9D-8A98-4CFA-94C2-E2074112639C}"/>
               </a:ext>
             </a:extLst>
           </p:cNvPr>
@@ -11878,7 +11844,7 @@
           <p:cNvPr id="8" name="Textfeld 7">
             <a:extLst>
               <a:ext uri="{FF2B5EF4-FFF2-40B4-BE49-F238E27FC236}">
-                <a16:creationId xmlns:a16="http://schemas.microsoft.com/office/drawing/2014/main" xmlns="" id="{8E05CB3E-FC8B-4C84-8452-A027AF29808D}"/>
+                <a16:creationId xmlns:a16="http://schemas.microsoft.com/office/drawing/2014/main" id="{8E05CB3E-FC8B-4C84-8452-A027AF29808D}"/>
               </a:ext>
             </a:extLst>
           </p:cNvPr>
@@ -11976,28 +11942,28 @@
                 <a:gridCol w="1089020">
                   <a:extLst>
                     <a:ext uri="{9D8B030D-6E8A-4147-A177-3AD203B41FA5}">
-                      <a16:colId xmlns:a16="http://schemas.microsoft.com/office/drawing/2014/main" xmlns="" val="20000"/>
+                      <a16:colId xmlns:a16="http://schemas.microsoft.com/office/drawing/2014/main" val="20000"/>
                     </a:ext>
                   </a:extLst>
                 </a:gridCol>
                 <a:gridCol w="996778">
                   <a:extLst>
                     <a:ext uri="{9D8B030D-6E8A-4147-A177-3AD203B41FA5}">
-                      <a16:colId xmlns:a16="http://schemas.microsoft.com/office/drawing/2014/main" xmlns="" val="20001"/>
+                      <a16:colId xmlns:a16="http://schemas.microsoft.com/office/drawing/2014/main" val="20001"/>
                     </a:ext>
                   </a:extLst>
                 </a:gridCol>
                 <a:gridCol w="2075935">
                   <a:extLst>
                     <a:ext uri="{9D8B030D-6E8A-4147-A177-3AD203B41FA5}">
-                      <a16:colId xmlns:a16="http://schemas.microsoft.com/office/drawing/2014/main" xmlns="" val="20002"/>
+                      <a16:colId xmlns:a16="http://schemas.microsoft.com/office/drawing/2014/main" val="20002"/>
                     </a:ext>
                   </a:extLst>
                 </a:gridCol>
                 <a:gridCol w="2314833">
                   <a:extLst>
                     <a:ext uri="{9D8B030D-6E8A-4147-A177-3AD203B41FA5}">
-                      <a16:colId xmlns:a16="http://schemas.microsoft.com/office/drawing/2014/main" xmlns="" val="20003"/>
+                      <a16:colId xmlns:a16="http://schemas.microsoft.com/office/drawing/2014/main" val="20003"/>
                     </a:ext>
                   </a:extLst>
                 </a:gridCol>
@@ -12133,7 +12099,7 @@
                 </a:tc>
                 <a:extLst>
                   <a:ext uri="{0D108BD9-81ED-4DB2-BD59-A6C34878D82A}">
-                    <a16:rowId xmlns:a16="http://schemas.microsoft.com/office/drawing/2014/main" xmlns="" val="10000"/>
+                    <a16:rowId xmlns:a16="http://schemas.microsoft.com/office/drawing/2014/main" val="10000"/>
                   </a:ext>
                 </a:extLst>
               </a:tr>
@@ -12314,7 +12280,7 @@
                 </a:tc>
                 <a:extLst>
                   <a:ext uri="{0D108BD9-81ED-4DB2-BD59-A6C34878D82A}">
-                    <a16:rowId xmlns:a16="http://schemas.microsoft.com/office/drawing/2014/main" xmlns="" val="10001"/>
+                    <a16:rowId xmlns:a16="http://schemas.microsoft.com/office/drawing/2014/main" val="10001"/>
                   </a:ext>
                 </a:extLst>
               </a:tr>
@@ -12431,7 +12397,7 @@
                 </a:tc>
                 <a:extLst>
                   <a:ext uri="{0D108BD9-81ED-4DB2-BD59-A6C34878D82A}">
-                    <a16:rowId xmlns:a16="http://schemas.microsoft.com/office/drawing/2014/main" xmlns="" val="10002"/>
+                    <a16:rowId xmlns:a16="http://schemas.microsoft.com/office/drawing/2014/main" val="10002"/>
                   </a:ext>
                 </a:extLst>
               </a:tr>
@@ -12567,7 +12533,7 @@
                 </a:tc>
                 <a:extLst>
                   <a:ext uri="{0D108BD9-81ED-4DB2-BD59-A6C34878D82A}">
-                    <a16:rowId xmlns:a16="http://schemas.microsoft.com/office/drawing/2014/main" xmlns="" val="10003"/>
+                    <a16:rowId xmlns:a16="http://schemas.microsoft.com/office/drawing/2014/main" val="10003"/>
                   </a:ext>
                 </a:extLst>
               </a:tr>
@@ -12703,7 +12669,7 @@
                 </a:tc>
                 <a:extLst>
                   <a:ext uri="{0D108BD9-81ED-4DB2-BD59-A6C34878D82A}">
-                    <a16:rowId xmlns:a16="http://schemas.microsoft.com/office/drawing/2014/main" xmlns="" val="10004"/>
+                    <a16:rowId xmlns:a16="http://schemas.microsoft.com/office/drawing/2014/main" val="10004"/>
                   </a:ext>
                 </a:extLst>
               </a:tr>
@@ -12746,7 +12712,7 @@
           <p:cNvPr id="10" name="Foliennummernplatzhalter 9">
             <a:extLst>
               <a:ext uri="{FF2B5EF4-FFF2-40B4-BE49-F238E27FC236}">
-                <a16:creationId xmlns:a16="http://schemas.microsoft.com/office/drawing/2014/main" xmlns="" id="{D931436D-0B25-4BC2-AB85-D177B4C7ED90}"/>
+                <a16:creationId xmlns:a16="http://schemas.microsoft.com/office/drawing/2014/main" id="{D931436D-0B25-4BC2-AB85-D177B4C7ED90}"/>
               </a:ext>
             </a:extLst>
           </p:cNvPr>
@@ -12796,7 +12762,7 @@
           <p:cNvPr id="12" name="Gerader Verbinder 11">
             <a:extLst>
               <a:ext uri="{FF2B5EF4-FFF2-40B4-BE49-F238E27FC236}">
-                <a16:creationId xmlns:a16="http://schemas.microsoft.com/office/drawing/2014/main" xmlns="" id="{4A855513-E5C1-4F05-A8FD-33AC62C22A5E}"/>
+                <a16:creationId xmlns:a16="http://schemas.microsoft.com/office/drawing/2014/main" id="{4A855513-E5C1-4F05-A8FD-33AC62C22A5E}"/>
               </a:ext>
             </a:extLst>
           </p:cNvPr>
@@ -12837,7 +12803,7 @@
           <p:cNvPr id="13" name="Gerader Verbinder 12">
             <a:extLst>
               <a:ext uri="{FF2B5EF4-FFF2-40B4-BE49-F238E27FC236}">
-                <a16:creationId xmlns:a16="http://schemas.microsoft.com/office/drawing/2014/main" xmlns="" id="{F2778992-5E28-437C-AEA9-F9BBD6E6F5BB}"/>
+                <a16:creationId xmlns:a16="http://schemas.microsoft.com/office/drawing/2014/main" id="{F2778992-5E28-437C-AEA9-F9BBD6E6F5BB}"/>
               </a:ext>
             </a:extLst>
           </p:cNvPr>
@@ -12878,7 +12844,7 @@
           <p:cNvPr id="14" name="Textfeld 13">
             <a:extLst>
               <a:ext uri="{FF2B5EF4-FFF2-40B4-BE49-F238E27FC236}">
-                <a16:creationId xmlns:a16="http://schemas.microsoft.com/office/drawing/2014/main" xmlns="" id="{6CF8FF9D-8A98-4CFA-94C2-E2074112639C}"/>
+                <a16:creationId xmlns:a16="http://schemas.microsoft.com/office/drawing/2014/main" id="{6CF8FF9D-8A98-4CFA-94C2-E2074112639C}"/>
               </a:ext>
             </a:extLst>
           </p:cNvPr>
@@ -12974,7 +12940,7 @@
           <p:cNvPr id="8" name="Textfeld 7">
             <a:extLst>
               <a:ext uri="{FF2B5EF4-FFF2-40B4-BE49-F238E27FC236}">
-                <a16:creationId xmlns:a16="http://schemas.microsoft.com/office/drawing/2014/main" xmlns="" id="{8E05CB3E-FC8B-4C84-8452-A027AF29808D}"/>
+                <a16:creationId xmlns:a16="http://schemas.microsoft.com/office/drawing/2014/main" id="{8E05CB3E-FC8B-4C84-8452-A027AF29808D}"/>
               </a:ext>
             </a:extLst>
           </p:cNvPr>
@@ -13002,7 +12968,7 @@
               <a:t>2.5 </a:t>
             </a:r>
             <a:r>
-              <a:rPr lang="de-DE" sz="2000" b="1" dirty="0" err="1" smtClean="0"/>
+              <a:rPr lang="de-DE" sz="2000" b="1" dirty="0" err="1"/>
               <a:t>LinkedList</a:t>
             </a:r>
             <a:endParaRPr lang="de-DE" sz="2000" b="1" dirty="0"/>
@@ -13035,26 +13001,13 @@
               <a:rPr lang="de-DE" dirty="0"/>
               <a:t>Daten werden in Ketten-Elementen gespeichert. Jedes zwischen Element kennt seinen nächsten </a:t>
             </a:r>
-            <a:r>
-              <a:rPr lang="de-DE" dirty="0"/>
-              <a:t/>
-            </a:r>
             <a:br>
               <a:rPr lang="de-DE" dirty="0"/>
             </a:br>
             <a:r>
               <a:rPr lang="de-DE" dirty="0"/>
-              <a:t>Nachbarn. Durch diese Kette kann man jedes Element ansprechen. Das Letze Element hat immer einen </a:t>
-            </a:r>
-            <a:r>
-              <a:rPr lang="de-DE" dirty="0" smtClean="0"/>
-              <a:t>Null </a:t>
-            </a:r>
-            <a:r>
-              <a:rPr lang="de-DE" dirty="0"/>
-              <a:t>Wert, da dieser der Letze Wert ist und keinen nächsten Wert besitzt. </a:t>
-            </a:r>
-            <a:endParaRPr lang="de-DE" dirty="0"/>
+              <a:t>Nachbarn. Durch diese Kette kann man jedes Element ansprechen. Das Letze Element hat immer einen Null Wert, da dieser der Letze Wert ist und keinen nächsten Wert besitzt. </a:t>
+            </a:r>
           </a:p>
         </p:txBody>
       </p:sp>
@@ -13093,7 +13046,7 @@
           <p:cNvPr id="10" name="Foliennummernplatzhalter 9">
             <a:extLst>
               <a:ext uri="{FF2B5EF4-FFF2-40B4-BE49-F238E27FC236}">
-                <a16:creationId xmlns:a16="http://schemas.microsoft.com/office/drawing/2014/main" xmlns="" id="{D931436D-0B25-4BC2-AB85-D177B4C7ED90}"/>
+                <a16:creationId xmlns:a16="http://schemas.microsoft.com/office/drawing/2014/main" id="{D931436D-0B25-4BC2-AB85-D177B4C7ED90}"/>
               </a:ext>
             </a:extLst>
           </p:cNvPr>
@@ -13143,7 +13096,7 @@
           <p:cNvPr id="12" name="Gerader Verbinder 11">
             <a:extLst>
               <a:ext uri="{FF2B5EF4-FFF2-40B4-BE49-F238E27FC236}">
-                <a16:creationId xmlns:a16="http://schemas.microsoft.com/office/drawing/2014/main" xmlns="" id="{4A855513-E5C1-4F05-A8FD-33AC62C22A5E}"/>
+                <a16:creationId xmlns:a16="http://schemas.microsoft.com/office/drawing/2014/main" id="{4A855513-E5C1-4F05-A8FD-33AC62C22A5E}"/>
               </a:ext>
             </a:extLst>
           </p:cNvPr>
@@ -13184,7 +13137,7 @@
           <p:cNvPr id="13" name="Gerader Verbinder 12">
             <a:extLst>
               <a:ext uri="{FF2B5EF4-FFF2-40B4-BE49-F238E27FC236}">
-                <a16:creationId xmlns:a16="http://schemas.microsoft.com/office/drawing/2014/main" xmlns="" id="{F2778992-5E28-437C-AEA9-F9BBD6E6F5BB}"/>
+                <a16:creationId xmlns:a16="http://schemas.microsoft.com/office/drawing/2014/main" id="{F2778992-5E28-437C-AEA9-F9BBD6E6F5BB}"/>
               </a:ext>
             </a:extLst>
           </p:cNvPr>
@@ -13225,7 +13178,7 @@
           <p:cNvPr id="14" name="Textfeld 13">
             <a:extLst>
               <a:ext uri="{FF2B5EF4-FFF2-40B4-BE49-F238E27FC236}">
-                <a16:creationId xmlns:a16="http://schemas.microsoft.com/office/drawing/2014/main" xmlns="" id="{6CF8FF9D-8A98-4CFA-94C2-E2074112639C}"/>
+                <a16:creationId xmlns:a16="http://schemas.microsoft.com/office/drawing/2014/main" id="{6CF8FF9D-8A98-4CFA-94C2-E2074112639C}"/>
               </a:ext>
             </a:extLst>
           </p:cNvPr>
@@ -13261,7 +13214,7 @@
           <p:cNvPr id="8" name="Textfeld 7">
             <a:extLst>
               <a:ext uri="{FF2B5EF4-FFF2-40B4-BE49-F238E27FC236}">
-                <a16:creationId xmlns:a16="http://schemas.microsoft.com/office/drawing/2014/main" xmlns="" id="{8E05CB3E-FC8B-4C84-8452-A027AF29808D}"/>
+                <a16:creationId xmlns:a16="http://schemas.microsoft.com/office/drawing/2014/main" id="{8E05CB3E-FC8B-4C84-8452-A027AF29808D}"/>
               </a:ext>
             </a:extLst>
           </p:cNvPr>
@@ -13364,28 +13317,28 @@
                 <a:gridCol w="1779375">
                   <a:extLst>
                     <a:ext uri="{9D8B030D-6E8A-4147-A177-3AD203B41FA5}">
-                      <a16:colId xmlns:a16="http://schemas.microsoft.com/office/drawing/2014/main" xmlns="" val="20000"/>
+                      <a16:colId xmlns:a16="http://schemas.microsoft.com/office/drawing/2014/main" val="20000"/>
                     </a:ext>
                   </a:extLst>
                 </a:gridCol>
                 <a:gridCol w="1095632">
                   <a:extLst>
                     <a:ext uri="{9D8B030D-6E8A-4147-A177-3AD203B41FA5}">
-                      <a16:colId xmlns:a16="http://schemas.microsoft.com/office/drawing/2014/main" xmlns="" val="20001"/>
+                      <a16:colId xmlns:a16="http://schemas.microsoft.com/office/drawing/2014/main" val="20001"/>
                     </a:ext>
                   </a:extLst>
                 </a:gridCol>
                 <a:gridCol w="1919416">
                   <a:extLst>
                     <a:ext uri="{9D8B030D-6E8A-4147-A177-3AD203B41FA5}">
-                      <a16:colId xmlns:a16="http://schemas.microsoft.com/office/drawing/2014/main" xmlns="" val="20002"/>
+                      <a16:colId xmlns:a16="http://schemas.microsoft.com/office/drawing/2014/main" val="20002"/>
                     </a:ext>
                   </a:extLst>
                 </a:gridCol>
                 <a:gridCol w="2139109">
                   <a:extLst>
                     <a:ext uri="{9D8B030D-6E8A-4147-A177-3AD203B41FA5}">
-                      <a16:colId xmlns:a16="http://schemas.microsoft.com/office/drawing/2014/main" xmlns="" val="20003"/>
+                      <a16:colId xmlns:a16="http://schemas.microsoft.com/office/drawing/2014/main" val="20003"/>
                     </a:ext>
                   </a:extLst>
                 </a:gridCol>
@@ -13509,7 +13462,7 @@
                 </a:tc>
                 <a:extLst>
                   <a:ext uri="{0D108BD9-81ED-4DB2-BD59-A6C34878D82A}">
-                    <a16:rowId xmlns:a16="http://schemas.microsoft.com/office/drawing/2014/main" xmlns="" val="10000"/>
+                    <a16:rowId xmlns:a16="http://schemas.microsoft.com/office/drawing/2014/main" val="10000"/>
                   </a:ext>
                 </a:extLst>
               </a:tr>
@@ -13648,7 +13601,7 @@
                 </a:tc>
                 <a:extLst>
                   <a:ext uri="{0D108BD9-81ED-4DB2-BD59-A6C34878D82A}">
-                    <a16:rowId xmlns:a16="http://schemas.microsoft.com/office/drawing/2014/main" xmlns="" val="10001"/>
+                    <a16:rowId xmlns:a16="http://schemas.microsoft.com/office/drawing/2014/main" val="10001"/>
                   </a:ext>
                 </a:extLst>
               </a:tr>
@@ -13783,7 +13736,7 @@
                 </a:tc>
                 <a:extLst>
                   <a:ext uri="{0D108BD9-81ED-4DB2-BD59-A6C34878D82A}">
-                    <a16:rowId xmlns:a16="http://schemas.microsoft.com/office/drawing/2014/main" xmlns="" val="10002"/>
+                    <a16:rowId xmlns:a16="http://schemas.microsoft.com/office/drawing/2014/main" val="10002"/>
                   </a:ext>
                 </a:extLst>
               </a:tr>
@@ -13941,7 +13894,7 @@
                 </a:tc>
                 <a:extLst>
                   <a:ext uri="{0D108BD9-81ED-4DB2-BD59-A6C34878D82A}">
-                    <a16:rowId xmlns:a16="http://schemas.microsoft.com/office/drawing/2014/main" xmlns="" val="10003"/>
+                    <a16:rowId xmlns:a16="http://schemas.microsoft.com/office/drawing/2014/main" val="10003"/>
                   </a:ext>
                 </a:extLst>
               </a:tr>
@@ -14080,7 +14033,7 @@
                 </a:tc>
                 <a:extLst>
                   <a:ext uri="{0D108BD9-81ED-4DB2-BD59-A6C34878D82A}">
-                    <a16:rowId xmlns:a16="http://schemas.microsoft.com/office/drawing/2014/main" xmlns="" val="10004"/>
+                    <a16:rowId xmlns:a16="http://schemas.microsoft.com/office/drawing/2014/main" val="10004"/>
                   </a:ext>
                 </a:extLst>
               </a:tr>
@@ -14265,7 +14218,7 @@
                 </a:tc>
                 <a:extLst>
                   <a:ext uri="{0D108BD9-81ED-4DB2-BD59-A6C34878D82A}">
-                    <a16:rowId xmlns:a16="http://schemas.microsoft.com/office/drawing/2014/main" xmlns="" val="10005"/>
+                    <a16:rowId xmlns:a16="http://schemas.microsoft.com/office/drawing/2014/main" val="10005"/>
                   </a:ext>
                 </a:extLst>
               </a:tr>
@@ -14423,7 +14376,7 @@
                 </a:tc>
                 <a:extLst>
                   <a:ext uri="{0D108BD9-81ED-4DB2-BD59-A6C34878D82A}">
-                    <a16:rowId xmlns:a16="http://schemas.microsoft.com/office/drawing/2014/main" xmlns="" val="10006"/>
+                    <a16:rowId xmlns:a16="http://schemas.microsoft.com/office/drawing/2014/main" val="10006"/>
                   </a:ext>
                 </a:extLst>
               </a:tr>
@@ -14578,7 +14531,7 @@
                 </a:tc>
                 <a:extLst>
                   <a:ext uri="{0D108BD9-81ED-4DB2-BD59-A6C34878D82A}">
-                    <a16:rowId xmlns:a16="http://schemas.microsoft.com/office/drawing/2014/main" xmlns="" val="10007"/>
+                    <a16:rowId xmlns:a16="http://schemas.microsoft.com/office/drawing/2014/main" val="10007"/>
                   </a:ext>
                 </a:extLst>
               </a:tr>
@@ -14717,7 +14670,7 @@
                 </a:tc>
                 <a:extLst>
                   <a:ext uri="{0D108BD9-81ED-4DB2-BD59-A6C34878D82A}">
-                    <a16:rowId xmlns:a16="http://schemas.microsoft.com/office/drawing/2014/main" xmlns="" val="10008"/>
+                    <a16:rowId xmlns:a16="http://schemas.microsoft.com/office/drawing/2014/main" val="10008"/>
                   </a:ext>
                 </a:extLst>
               </a:tr>
@@ -14760,7 +14713,7 @@
           <p:cNvPr id="10" name="Foliennummernplatzhalter 9">
             <a:extLst>
               <a:ext uri="{FF2B5EF4-FFF2-40B4-BE49-F238E27FC236}">
-                <a16:creationId xmlns:a16="http://schemas.microsoft.com/office/drawing/2014/main" xmlns="" id="{D931436D-0B25-4BC2-AB85-D177B4C7ED90}"/>
+                <a16:creationId xmlns:a16="http://schemas.microsoft.com/office/drawing/2014/main" id="{D931436D-0B25-4BC2-AB85-D177B4C7ED90}"/>
               </a:ext>
             </a:extLst>
           </p:cNvPr>
@@ -14810,7 +14763,7 @@
           <p:cNvPr id="12" name="Gerader Verbinder 11">
             <a:extLst>
               <a:ext uri="{FF2B5EF4-FFF2-40B4-BE49-F238E27FC236}">
-                <a16:creationId xmlns:a16="http://schemas.microsoft.com/office/drawing/2014/main" xmlns="" id="{4A855513-E5C1-4F05-A8FD-33AC62C22A5E}"/>
+                <a16:creationId xmlns:a16="http://schemas.microsoft.com/office/drawing/2014/main" id="{4A855513-E5C1-4F05-A8FD-33AC62C22A5E}"/>
               </a:ext>
             </a:extLst>
           </p:cNvPr>
@@ -14851,7 +14804,7 @@
           <p:cNvPr id="13" name="Gerader Verbinder 12">
             <a:extLst>
               <a:ext uri="{FF2B5EF4-FFF2-40B4-BE49-F238E27FC236}">
-                <a16:creationId xmlns:a16="http://schemas.microsoft.com/office/drawing/2014/main" xmlns="" id="{F2778992-5E28-437C-AEA9-F9BBD6E6F5BB}"/>
+                <a16:creationId xmlns:a16="http://schemas.microsoft.com/office/drawing/2014/main" id="{F2778992-5E28-437C-AEA9-F9BBD6E6F5BB}"/>
               </a:ext>
             </a:extLst>
           </p:cNvPr>
@@ -14892,7 +14845,7 @@
           <p:cNvPr id="14" name="Textfeld 13">
             <a:extLst>
               <a:ext uri="{FF2B5EF4-FFF2-40B4-BE49-F238E27FC236}">
-                <a16:creationId xmlns:a16="http://schemas.microsoft.com/office/drawing/2014/main" xmlns="" id="{6CF8FF9D-8A98-4CFA-94C2-E2074112639C}"/>
+                <a16:creationId xmlns:a16="http://schemas.microsoft.com/office/drawing/2014/main" id="{6CF8FF9D-8A98-4CFA-94C2-E2074112639C}"/>
               </a:ext>
             </a:extLst>
           </p:cNvPr>
@@ -14928,7 +14881,7 @@
           <p:cNvPr id="6" name="Textfeld 5">
             <a:extLst>
               <a:ext uri="{FF2B5EF4-FFF2-40B4-BE49-F238E27FC236}">
-                <a16:creationId xmlns:a16="http://schemas.microsoft.com/office/drawing/2014/main" xmlns="" id="{8E05CB3E-FC8B-4C84-8452-A027AF29808D}"/>
+                <a16:creationId xmlns:a16="http://schemas.microsoft.com/office/drawing/2014/main" id="{8E05CB3E-FC8B-4C84-8452-A027AF29808D}"/>
               </a:ext>
             </a:extLst>
           </p:cNvPr>
@@ -14976,7 +14929,7 @@
           <p:cNvPr id="8" name="Textfeld 7">
             <a:extLst>
               <a:ext uri="{FF2B5EF4-FFF2-40B4-BE49-F238E27FC236}">
-                <a16:creationId xmlns:a16="http://schemas.microsoft.com/office/drawing/2014/main" xmlns="" id="{4842BEFA-10C3-45C0-8997-167BE0586DAC}"/>
+                <a16:creationId xmlns:a16="http://schemas.microsoft.com/office/drawing/2014/main" id="{4842BEFA-10C3-45C0-8997-167BE0586DAC}"/>
               </a:ext>
             </a:extLst>
           </p:cNvPr>
@@ -15111,7 +15064,7 @@
           <p:cNvPr id="3" name="Textfeld 2">
             <a:extLst>
               <a:ext uri="{FF2B5EF4-FFF2-40B4-BE49-F238E27FC236}">
-                <a16:creationId xmlns:a16="http://schemas.microsoft.com/office/drawing/2014/main" xmlns="" id="{B616C74B-1A1C-4612-8D7A-608508876D6B}"/>
+                <a16:creationId xmlns:a16="http://schemas.microsoft.com/office/drawing/2014/main" id="{B616C74B-1A1C-4612-8D7A-608508876D6B}"/>
               </a:ext>
             </a:extLst>
           </p:cNvPr>
@@ -15176,7 +15129,7 @@
           <p:cNvPr id="10" name="Foliennummernplatzhalter 9">
             <a:extLst>
               <a:ext uri="{FF2B5EF4-FFF2-40B4-BE49-F238E27FC236}">
-                <a16:creationId xmlns:a16="http://schemas.microsoft.com/office/drawing/2014/main" xmlns="" id="{D931436D-0B25-4BC2-AB85-D177B4C7ED90}"/>
+                <a16:creationId xmlns:a16="http://schemas.microsoft.com/office/drawing/2014/main" id="{D931436D-0B25-4BC2-AB85-D177B4C7ED90}"/>
               </a:ext>
             </a:extLst>
           </p:cNvPr>
@@ -15226,7 +15179,7 @@
           <p:cNvPr id="12" name="Gerader Verbinder 11">
             <a:extLst>
               <a:ext uri="{FF2B5EF4-FFF2-40B4-BE49-F238E27FC236}">
-                <a16:creationId xmlns:a16="http://schemas.microsoft.com/office/drawing/2014/main" xmlns="" id="{4A855513-E5C1-4F05-A8FD-33AC62C22A5E}"/>
+                <a16:creationId xmlns:a16="http://schemas.microsoft.com/office/drawing/2014/main" id="{4A855513-E5C1-4F05-A8FD-33AC62C22A5E}"/>
               </a:ext>
             </a:extLst>
           </p:cNvPr>
@@ -15267,7 +15220,7 @@
           <p:cNvPr id="13" name="Gerader Verbinder 12">
             <a:extLst>
               <a:ext uri="{FF2B5EF4-FFF2-40B4-BE49-F238E27FC236}">
-                <a16:creationId xmlns:a16="http://schemas.microsoft.com/office/drawing/2014/main" xmlns="" id="{F2778992-5E28-437C-AEA9-F9BBD6E6F5BB}"/>
+                <a16:creationId xmlns:a16="http://schemas.microsoft.com/office/drawing/2014/main" id="{F2778992-5E28-437C-AEA9-F9BBD6E6F5BB}"/>
               </a:ext>
             </a:extLst>
           </p:cNvPr>
@@ -15308,7 +15261,7 @@
           <p:cNvPr id="14" name="Textfeld 13">
             <a:extLst>
               <a:ext uri="{FF2B5EF4-FFF2-40B4-BE49-F238E27FC236}">
-                <a16:creationId xmlns:a16="http://schemas.microsoft.com/office/drawing/2014/main" xmlns="" id="{6CF8FF9D-8A98-4CFA-94C2-E2074112639C}"/>
+                <a16:creationId xmlns:a16="http://schemas.microsoft.com/office/drawing/2014/main" id="{6CF8FF9D-8A98-4CFA-94C2-E2074112639C}"/>
               </a:ext>
             </a:extLst>
           </p:cNvPr>
@@ -15344,7 +15297,7 @@
           <p:cNvPr id="6" name="Textfeld 5">
             <a:extLst>
               <a:ext uri="{FF2B5EF4-FFF2-40B4-BE49-F238E27FC236}">
-                <a16:creationId xmlns:a16="http://schemas.microsoft.com/office/drawing/2014/main" xmlns="" id="{8E05CB3E-FC8B-4C84-8452-A027AF29808D}"/>
+                <a16:creationId xmlns:a16="http://schemas.microsoft.com/office/drawing/2014/main" id="{8E05CB3E-FC8B-4C84-8452-A027AF29808D}"/>
               </a:ext>
             </a:extLst>
           </p:cNvPr>
@@ -15392,7 +15345,7 @@
           <p:cNvPr id="3" name="Textfeld 2">
             <a:extLst>
               <a:ext uri="{FF2B5EF4-FFF2-40B4-BE49-F238E27FC236}">
-                <a16:creationId xmlns:a16="http://schemas.microsoft.com/office/drawing/2014/main" xmlns="" id="{B616C74B-1A1C-4612-8D7A-608508876D6B}"/>
+                <a16:creationId xmlns:a16="http://schemas.microsoft.com/office/drawing/2014/main" id="{B616C74B-1A1C-4612-8D7A-608508876D6B}"/>
               </a:ext>
             </a:extLst>
           </p:cNvPr>
@@ -15427,7 +15380,7 @@
           <p:cNvPr id="8" name="Grafik 7">
             <a:extLst>
               <a:ext uri="{FF2B5EF4-FFF2-40B4-BE49-F238E27FC236}">
-                <a16:creationId xmlns:a16="http://schemas.microsoft.com/office/drawing/2014/main" xmlns="" id="{0DFE0BE2-DBAD-43B4-8C9D-86A52F855DBF}"/>
+                <a16:creationId xmlns:a16="http://schemas.microsoft.com/office/drawing/2014/main" id="{0DFE0BE2-DBAD-43B4-8C9D-86A52F855DBF}"/>
               </a:ext>
             </a:extLst>
           </p:cNvPr>
@@ -15487,7 +15440,7 @@
           <p:cNvPr id="10" name="Foliennummernplatzhalter 9">
             <a:extLst>
               <a:ext uri="{FF2B5EF4-FFF2-40B4-BE49-F238E27FC236}">
-                <a16:creationId xmlns:a16="http://schemas.microsoft.com/office/drawing/2014/main" xmlns="" id="{D931436D-0B25-4BC2-AB85-D177B4C7ED90}"/>
+                <a16:creationId xmlns:a16="http://schemas.microsoft.com/office/drawing/2014/main" id="{D931436D-0B25-4BC2-AB85-D177B4C7ED90}"/>
               </a:ext>
             </a:extLst>
           </p:cNvPr>
@@ -15537,7 +15490,7 @@
           <p:cNvPr id="12" name="Gerader Verbinder 11">
             <a:extLst>
               <a:ext uri="{FF2B5EF4-FFF2-40B4-BE49-F238E27FC236}">
-                <a16:creationId xmlns:a16="http://schemas.microsoft.com/office/drawing/2014/main" xmlns="" id="{4A855513-E5C1-4F05-A8FD-33AC62C22A5E}"/>
+                <a16:creationId xmlns:a16="http://schemas.microsoft.com/office/drawing/2014/main" id="{4A855513-E5C1-4F05-A8FD-33AC62C22A5E}"/>
               </a:ext>
             </a:extLst>
           </p:cNvPr>
@@ -15578,7 +15531,7 @@
           <p:cNvPr id="13" name="Gerader Verbinder 12">
             <a:extLst>
               <a:ext uri="{FF2B5EF4-FFF2-40B4-BE49-F238E27FC236}">
-                <a16:creationId xmlns:a16="http://schemas.microsoft.com/office/drawing/2014/main" xmlns="" id="{F2778992-5E28-437C-AEA9-F9BBD6E6F5BB}"/>
+                <a16:creationId xmlns:a16="http://schemas.microsoft.com/office/drawing/2014/main" id="{F2778992-5E28-437C-AEA9-F9BBD6E6F5BB}"/>
               </a:ext>
             </a:extLst>
           </p:cNvPr>
@@ -15619,7 +15572,7 @@
           <p:cNvPr id="14" name="Textfeld 13">
             <a:extLst>
               <a:ext uri="{FF2B5EF4-FFF2-40B4-BE49-F238E27FC236}">
-                <a16:creationId xmlns:a16="http://schemas.microsoft.com/office/drawing/2014/main" xmlns="" id="{6CF8FF9D-8A98-4CFA-94C2-E2074112639C}"/>
+                <a16:creationId xmlns:a16="http://schemas.microsoft.com/office/drawing/2014/main" id="{6CF8FF9D-8A98-4CFA-94C2-E2074112639C}"/>
               </a:ext>
             </a:extLst>
           </p:cNvPr>
@@ -15655,7 +15608,7 @@
           <p:cNvPr id="6" name="Textfeld 5">
             <a:extLst>
               <a:ext uri="{FF2B5EF4-FFF2-40B4-BE49-F238E27FC236}">
-                <a16:creationId xmlns:a16="http://schemas.microsoft.com/office/drawing/2014/main" xmlns="" id="{8E05CB3E-FC8B-4C84-8452-A027AF29808D}"/>
+                <a16:creationId xmlns:a16="http://schemas.microsoft.com/office/drawing/2014/main" id="{8E05CB3E-FC8B-4C84-8452-A027AF29808D}"/>
               </a:ext>
             </a:extLst>
           </p:cNvPr>
@@ -15703,7 +15656,7 @@
           <p:cNvPr id="3" name="Textfeld 2">
             <a:extLst>
               <a:ext uri="{FF2B5EF4-FFF2-40B4-BE49-F238E27FC236}">
-                <a16:creationId xmlns:a16="http://schemas.microsoft.com/office/drawing/2014/main" xmlns="" id="{B616C74B-1A1C-4612-8D7A-608508876D6B}"/>
+                <a16:creationId xmlns:a16="http://schemas.microsoft.com/office/drawing/2014/main" id="{B616C74B-1A1C-4612-8D7A-608508876D6B}"/>
               </a:ext>
             </a:extLst>
           </p:cNvPr>
@@ -15738,7 +15691,7 @@
           <p:cNvPr id="11" name="Textfeld 10">
             <a:extLst>
               <a:ext uri="{FF2B5EF4-FFF2-40B4-BE49-F238E27FC236}">
-                <a16:creationId xmlns:a16="http://schemas.microsoft.com/office/drawing/2014/main" xmlns="" id="{24B508F8-733A-43EF-9B1C-791EC1949295}"/>
+                <a16:creationId xmlns:a16="http://schemas.microsoft.com/office/drawing/2014/main" id="{24B508F8-733A-43EF-9B1C-791EC1949295}"/>
               </a:ext>
             </a:extLst>
           </p:cNvPr>
@@ -16454,7 +16407,7 @@
           <p:cNvPr id="10" name="Foliennummernplatzhalter 9">
             <a:extLst>
               <a:ext uri="{FF2B5EF4-FFF2-40B4-BE49-F238E27FC236}">
-                <a16:creationId xmlns:a16="http://schemas.microsoft.com/office/drawing/2014/main" xmlns="" id="{D931436D-0B25-4BC2-AB85-D177B4C7ED90}"/>
+                <a16:creationId xmlns:a16="http://schemas.microsoft.com/office/drawing/2014/main" id="{D931436D-0B25-4BC2-AB85-D177B4C7ED90}"/>
               </a:ext>
             </a:extLst>
           </p:cNvPr>
@@ -16504,7 +16457,7 @@
           <p:cNvPr id="12" name="Gerader Verbinder 11">
             <a:extLst>
               <a:ext uri="{FF2B5EF4-FFF2-40B4-BE49-F238E27FC236}">
-                <a16:creationId xmlns:a16="http://schemas.microsoft.com/office/drawing/2014/main" xmlns="" id="{4A855513-E5C1-4F05-A8FD-33AC62C22A5E}"/>
+                <a16:creationId xmlns:a16="http://schemas.microsoft.com/office/drawing/2014/main" id="{4A855513-E5C1-4F05-A8FD-33AC62C22A5E}"/>
               </a:ext>
             </a:extLst>
           </p:cNvPr>
@@ -16545,7 +16498,7 @@
           <p:cNvPr id="13" name="Gerader Verbinder 12">
             <a:extLst>
               <a:ext uri="{FF2B5EF4-FFF2-40B4-BE49-F238E27FC236}">
-                <a16:creationId xmlns:a16="http://schemas.microsoft.com/office/drawing/2014/main" xmlns="" id="{F2778992-5E28-437C-AEA9-F9BBD6E6F5BB}"/>
+                <a16:creationId xmlns:a16="http://schemas.microsoft.com/office/drawing/2014/main" id="{F2778992-5E28-437C-AEA9-F9BBD6E6F5BB}"/>
               </a:ext>
             </a:extLst>
           </p:cNvPr>
@@ -16586,7 +16539,7 @@
           <p:cNvPr id="14" name="Textfeld 13">
             <a:extLst>
               <a:ext uri="{FF2B5EF4-FFF2-40B4-BE49-F238E27FC236}">
-                <a16:creationId xmlns:a16="http://schemas.microsoft.com/office/drawing/2014/main" xmlns="" id="{6CF8FF9D-8A98-4CFA-94C2-E2074112639C}"/>
+                <a16:creationId xmlns:a16="http://schemas.microsoft.com/office/drawing/2014/main" id="{6CF8FF9D-8A98-4CFA-94C2-E2074112639C}"/>
               </a:ext>
             </a:extLst>
           </p:cNvPr>
@@ -16622,7 +16575,7 @@
           <p:cNvPr id="6" name="Textfeld 5">
             <a:extLst>
               <a:ext uri="{FF2B5EF4-FFF2-40B4-BE49-F238E27FC236}">
-                <a16:creationId xmlns:a16="http://schemas.microsoft.com/office/drawing/2014/main" xmlns="" id="{8E05CB3E-FC8B-4C84-8452-A027AF29808D}"/>
+                <a16:creationId xmlns:a16="http://schemas.microsoft.com/office/drawing/2014/main" id="{8E05CB3E-FC8B-4C84-8452-A027AF29808D}"/>
               </a:ext>
             </a:extLst>
           </p:cNvPr>
@@ -16670,7 +16623,7 @@
           <p:cNvPr id="3" name="Textfeld 2">
             <a:extLst>
               <a:ext uri="{FF2B5EF4-FFF2-40B4-BE49-F238E27FC236}">
-                <a16:creationId xmlns:a16="http://schemas.microsoft.com/office/drawing/2014/main" xmlns="" id="{B616C74B-1A1C-4612-8D7A-608508876D6B}"/>
+                <a16:creationId xmlns:a16="http://schemas.microsoft.com/office/drawing/2014/main" id="{B616C74B-1A1C-4612-8D7A-608508876D6B}"/>
               </a:ext>
             </a:extLst>
           </p:cNvPr>
@@ -16705,7 +16658,7 @@
           <p:cNvPr id="11" name="Textfeld 10">
             <a:extLst>
               <a:ext uri="{FF2B5EF4-FFF2-40B4-BE49-F238E27FC236}">
-                <a16:creationId xmlns:a16="http://schemas.microsoft.com/office/drawing/2014/main" xmlns="" id="{24B508F8-733A-43EF-9B1C-791EC1949295}"/>
+                <a16:creationId xmlns:a16="http://schemas.microsoft.com/office/drawing/2014/main" id="{24B508F8-733A-43EF-9B1C-791EC1949295}"/>
               </a:ext>
             </a:extLst>
           </p:cNvPr>
@@ -17641,7 +17594,7 @@
           <p:cNvPr id="10" name="Foliennummernplatzhalter 9">
             <a:extLst>
               <a:ext uri="{FF2B5EF4-FFF2-40B4-BE49-F238E27FC236}">
-                <a16:creationId xmlns:a16="http://schemas.microsoft.com/office/drawing/2014/main" xmlns="" id="{D931436D-0B25-4BC2-AB85-D177B4C7ED90}"/>
+                <a16:creationId xmlns:a16="http://schemas.microsoft.com/office/drawing/2014/main" id="{D931436D-0B25-4BC2-AB85-D177B4C7ED90}"/>
               </a:ext>
             </a:extLst>
           </p:cNvPr>
@@ -17691,7 +17644,7 @@
           <p:cNvPr id="12" name="Gerader Verbinder 11">
             <a:extLst>
               <a:ext uri="{FF2B5EF4-FFF2-40B4-BE49-F238E27FC236}">
-                <a16:creationId xmlns:a16="http://schemas.microsoft.com/office/drawing/2014/main" xmlns="" id="{4A855513-E5C1-4F05-A8FD-33AC62C22A5E}"/>
+                <a16:creationId xmlns:a16="http://schemas.microsoft.com/office/drawing/2014/main" id="{4A855513-E5C1-4F05-A8FD-33AC62C22A5E}"/>
               </a:ext>
             </a:extLst>
           </p:cNvPr>
@@ -17732,7 +17685,7 @@
           <p:cNvPr id="13" name="Gerader Verbinder 12">
             <a:extLst>
               <a:ext uri="{FF2B5EF4-FFF2-40B4-BE49-F238E27FC236}">
-                <a16:creationId xmlns:a16="http://schemas.microsoft.com/office/drawing/2014/main" xmlns="" id="{F2778992-5E28-437C-AEA9-F9BBD6E6F5BB}"/>
+                <a16:creationId xmlns:a16="http://schemas.microsoft.com/office/drawing/2014/main" id="{F2778992-5E28-437C-AEA9-F9BBD6E6F5BB}"/>
               </a:ext>
             </a:extLst>
           </p:cNvPr>
@@ -17773,7 +17726,7 @@
           <p:cNvPr id="14" name="Textfeld 13">
             <a:extLst>
               <a:ext uri="{FF2B5EF4-FFF2-40B4-BE49-F238E27FC236}">
-                <a16:creationId xmlns:a16="http://schemas.microsoft.com/office/drawing/2014/main" xmlns="" id="{6CF8FF9D-8A98-4CFA-94C2-E2074112639C}"/>
+                <a16:creationId xmlns:a16="http://schemas.microsoft.com/office/drawing/2014/main" id="{6CF8FF9D-8A98-4CFA-94C2-E2074112639C}"/>
               </a:ext>
             </a:extLst>
           </p:cNvPr>
@@ -17809,7 +17762,7 @@
           <p:cNvPr id="6" name="Textfeld 5">
             <a:extLst>
               <a:ext uri="{FF2B5EF4-FFF2-40B4-BE49-F238E27FC236}">
-                <a16:creationId xmlns:a16="http://schemas.microsoft.com/office/drawing/2014/main" xmlns="" id="{8E05CB3E-FC8B-4C84-8452-A027AF29808D}"/>
+                <a16:creationId xmlns:a16="http://schemas.microsoft.com/office/drawing/2014/main" id="{8E05CB3E-FC8B-4C84-8452-A027AF29808D}"/>
               </a:ext>
             </a:extLst>
           </p:cNvPr>
@@ -17834,7 +17787,7 @@
           <a:p>
             <a:r>
               <a:rPr lang="de-DE" sz="2000" b="1" dirty="0"/>
-              <a:t>4. Kompilierung</a:t>
+              <a:t>3. Tests</a:t>
             </a:r>
           </a:p>
           <a:p>
@@ -17854,10 +17807,10 @@
       </p:sp>
       <p:sp>
         <p:nvSpPr>
-          <p:cNvPr id="8" name="Textfeld 7">
+          <p:cNvPr id="9" name="Textfeld 8">
             <a:extLst>
               <a:ext uri="{FF2B5EF4-FFF2-40B4-BE49-F238E27FC236}">
-                <a16:creationId xmlns:a16="http://schemas.microsoft.com/office/drawing/2014/main" xmlns="" id="{4842BEFA-10C3-45C0-8997-167BE0586DAC}"/>
+                <a16:creationId xmlns:a16="http://schemas.microsoft.com/office/drawing/2014/main" id="{105407A1-FCD8-4DB9-8051-366A6497ED37}"/>
               </a:ext>
             </a:extLst>
           </p:cNvPr>
@@ -17866,7 +17819,7 @@
         </p:nvSpPr>
         <p:spPr>
           <a:xfrm>
-            <a:off x="783771" y="1945319"/>
+            <a:off x="1085461" y="1568119"/>
             <a:ext cx="10021077" cy="3046988"/>
           </a:xfrm>
           <a:prstGeom prst="rect">
@@ -17892,7 +17845,7 @@
                 </a:solidFill>
                 <a:latin typeface="+mj-lt"/>
               </a:rPr>
-              <a:t>Windows:</a:t>
+              <a:t>Erläuterung:</a:t>
             </a:r>
           </a:p>
           <a:p>
@@ -17903,17 +17856,26 @@
                 </a:solidFill>
                 <a:latin typeface="+mj-lt"/>
               </a:rPr>
-              <a:t>Öffne das Projekt in Visual Studio und klicke das Test-Projekt und wähle es als Start-Projekt aus. Ohne diese Einstellung wird möglicherweise versuch eine .</a:t>
-            </a:r>
-            <a:r>
-              <a:rPr lang="de-DE" sz="1600" dirty="0" err="1">
+              <a:t>Da wir schnell festgestellt haben, dass es sehr schwierig ist unsere Collections auf mehreren Plattformen fortlaufend zu testen, haben wir uns dafür entscheiden ein eigenes Testsystem zu schreiben.</a:t>
+            </a:r>
+          </a:p>
+          <a:p>
+            <a:pPr>
+              <a:lnSpc>
+                <a:spcPct val="200000"/>
+              </a:lnSpc>
+            </a:pPr>
+            <a:r>
+              <a:rPr lang="de-DE" sz="1600" b="1" dirty="0">
                 <a:solidFill>
                   <a:srgbClr val="000000"/>
                 </a:solidFill>
                 <a:latin typeface="+mj-lt"/>
               </a:rPr>
-              <a:t>lib</a:t>
-            </a:r>
+              <a:t>Funktionsweise:</a:t>
+            </a:r>
+          </a:p>
+          <a:p>
             <a:r>
               <a:rPr lang="de-DE" sz="1600" dirty="0">
                 <a:solidFill>
@@ -17921,7 +17883,7 @@
                 </a:solidFill>
                 <a:latin typeface="+mj-lt"/>
               </a:rPr>
-              <a:t> Datei zu öffnen, dort wird dann ein Fehler angezeigt.</a:t>
+              <a:t>Unsere Testfunktionen nehmen zwei Werte auf. Einer welcher der erwartetet Wert ist und welcher Wert zurückgeliefert wird. Am Ende bekommt man eine Auflistung wie viele Test geklappt oder fehlgeschlagen sind.</a:t>
             </a:r>
           </a:p>
           <a:p>
@@ -17933,22 +17895,24 @@
             </a:endParaRPr>
           </a:p>
           <a:p>
-            <a:pPr>
-              <a:lnSpc>
-                <a:spcPct val="200000"/>
-              </a:lnSpc>
-            </a:pPr>
-            <a:r>
-              <a:rPr lang="de-DE" sz="1600" b="1" dirty="0">
+            <a:r>
+              <a:rPr lang="de-DE" sz="1600" dirty="0">
                 <a:solidFill>
                   <a:srgbClr val="000000"/>
                 </a:solidFill>
                 <a:latin typeface="+mj-lt"/>
               </a:rPr>
-              <a:t>Linux:</a:t>
-            </a:r>
-          </a:p>
-          <a:p>
+              <a:t>Die Testfunktionen unterstützen Integer, String und </a:t>
+            </a:r>
+            <a:r>
+              <a:rPr lang="de-DE" sz="1600" dirty="0" err="1">
+                <a:solidFill>
+                  <a:srgbClr val="000000"/>
+                </a:solidFill>
+                <a:latin typeface="+mj-lt"/>
+              </a:rPr>
+              <a:t>CollectionError</a:t>
+            </a:r>
             <a:r>
               <a:rPr lang="de-DE" sz="1600" dirty="0">
                 <a:solidFill>
@@ -17956,69 +17920,11 @@
                 </a:solidFill>
                 <a:latin typeface="+mj-lt"/>
               </a:rPr>
-              <a:t>Navigiere zu der </a:t>
-            </a:r>
-            <a:r>
-              <a:rPr lang="de-DE" sz="1600" dirty="0" err="1">
-                <a:solidFill>
-                  <a:srgbClr val="000000"/>
-                </a:solidFill>
-                <a:latin typeface="+mj-lt"/>
-              </a:rPr>
-              <a:t>makefile</a:t>
-            </a:r>
-            <a:r>
-              <a:rPr lang="de-DE" sz="1600" dirty="0">
-                <a:solidFill>
-                  <a:srgbClr val="000000"/>
-                </a:solidFill>
-                <a:latin typeface="+mj-lt"/>
-              </a:rPr>
-              <a:t>. Dort befindet sich auch ein Skript das zum kompilieren genutzt werden kann. Es erstellt einen bin Order für Temporäre Daten, danach kompiliert es und startet das fertige Programm danach.</a:t>
-            </a:r>
-          </a:p>
-          <a:p>
-            <a:r>
-              <a:rPr lang="de-DE" sz="1600" dirty="0">
-                <a:solidFill>
-                  <a:srgbClr val="000000"/>
-                </a:solidFill>
-                <a:latin typeface="+mj-lt"/>
-              </a:rPr>
-              <a:t>Vergiss nicht die Skript-Datei ausführbar zu machen mit </a:t>
-            </a:r>
-            <a:r>
-              <a:rPr lang="de-DE" sz="1600" dirty="0" err="1">
-                <a:solidFill>
-                  <a:srgbClr val="000000"/>
-                </a:solidFill>
-                <a:latin typeface="+mj-lt"/>
-              </a:rPr>
-              <a:t>chmod</a:t>
-            </a:r>
-            <a:r>
-              <a:rPr lang="de-DE" sz="1600" dirty="0">
-                <a:solidFill>
-                  <a:srgbClr val="000000"/>
-                </a:solidFill>
-                <a:latin typeface="+mj-lt"/>
-              </a:rPr>
-              <a:t> +x FileName.sh. </a:t>
-            </a:r>
-          </a:p>
-          <a:p>
-            <a:r>
-              <a:rPr lang="de-DE" sz="1600" dirty="0">
-                <a:solidFill>
-                  <a:srgbClr val="000000"/>
-                </a:solidFill>
-                <a:latin typeface="+mj-lt"/>
-              </a:rPr>
-              <a:t>Dann zum Öffnen ./Filename.sh</a:t>
-            </a:r>
-          </a:p>
-          <a:p>
-            <a:endParaRPr lang="de-DE" sz="1600" b="0" i="0" u="none" strike="noStrike" baseline="0" dirty="0">
+              <a:t> Werte.</a:t>
+            </a:r>
+          </a:p>
+          <a:p>
+            <a:endParaRPr lang="de-DE" sz="1600" dirty="0">
               <a:solidFill>
                 <a:srgbClr val="000000"/>
               </a:solidFill>
@@ -18027,10 +17933,40 @@
           </a:p>
         </p:txBody>
       </p:sp>
+      <p:pic>
+        <p:nvPicPr>
+          <p:cNvPr id="4" name="Grafik 3">
+            <a:extLst>
+              <a:ext uri="{FF2B5EF4-FFF2-40B4-BE49-F238E27FC236}">
+                <a16:creationId xmlns:a16="http://schemas.microsoft.com/office/drawing/2014/main" id="{76244B43-9E69-4F23-9AD7-C79615969921}"/>
+              </a:ext>
+            </a:extLst>
+          </p:cNvPr>
+          <p:cNvPicPr>
+            <a:picLocks noChangeAspect="1"/>
+          </p:cNvPicPr>
+          <p:nvPr/>
+        </p:nvPicPr>
+        <p:blipFill>
+          <a:blip r:embed="rId2"/>
+          <a:stretch>
+            <a:fillRect/>
+          </a:stretch>
+        </p:blipFill>
+        <p:spPr>
+          <a:xfrm>
+            <a:off x="1496607" y="4558963"/>
+            <a:ext cx="7868748" cy="1133633"/>
+          </a:xfrm>
+          <a:prstGeom prst="rect">
+            <a:avLst/>
+          </a:prstGeom>
+        </p:spPr>
+      </p:pic>
     </p:spTree>
     <p:extLst>
       <p:ext uri="{BB962C8B-B14F-4D97-AF65-F5344CB8AC3E}">
-        <p14:creationId xmlns:p14="http://schemas.microsoft.com/office/powerpoint/2010/main" val="2796430297"/>
+        <p14:creationId xmlns:p14="http://schemas.microsoft.com/office/powerpoint/2010/main" val="588677708"/>
       </p:ext>
     </p:extLst>
   </p:cSld>
@@ -18062,7 +17998,7 @@
           <p:cNvPr id="10" name="Foliennummernplatzhalter 9">
             <a:extLst>
               <a:ext uri="{FF2B5EF4-FFF2-40B4-BE49-F238E27FC236}">
-                <a16:creationId xmlns:a16="http://schemas.microsoft.com/office/drawing/2014/main" xmlns="" id="{D931436D-0B25-4BC2-AB85-D177B4C7ED90}"/>
+                <a16:creationId xmlns:a16="http://schemas.microsoft.com/office/drawing/2014/main" id="{D931436D-0B25-4BC2-AB85-D177B4C7ED90}"/>
               </a:ext>
             </a:extLst>
           </p:cNvPr>
@@ -18112,7 +18048,7 @@
           <p:cNvPr id="12" name="Gerader Verbinder 11">
             <a:extLst>
               <a:ext uri="{FF2B5EF4-FFF2-40B4-BE49-F238E27FC236}">
-                <a16:creationId xmlns:a16="http://schemas.microsoft.com/office/drawing/2014/main" xmlns="" id="{4A855513-E5C1-4F05-A8FD-33AC62C22A5E}"/>
+                <a16:creationId xmlns:a16="http://schemas.microsoft.com/office/drawing/2014/main" id="{4A855513-E5C1-4F05-A8FD-33AC62C22A5E}"/>
               </a:ext>
             </a:extLst>
           </p:cNvPr>
@@ -18153,7 +18089,7 @@
           <p:cNvPr id="13" name="Gerader Verbinder 12">
             <a:extLst>
               <a:ext uri="{FF2B5EF4-FFF2-40B4-BE49-F238E27FC236}">
-                <a16:creationId xmlns:a16="http://schemas.microsoft.com/office/drawing/2014/main" xmlns="" id="{F2778992-5E28-437C-AEA9-F9BBD6E6F5BB}"/>
+                <a16:creationId xmlns:a16="http://schemas.microsoft.com/office/drawing/2014/main" id="{F2778992-5E28-437C-AEA9-F9BBD6E6F5BB}"/>
               </a:ext>
             </a:extLst>
           </p:cNvPr>
@@ -18194,7 +18130,7 @@
           <p:cNvPr id="14" name="Textfeld 13">
             <a:extLst>
               <a:ext uri="{FF2B5EF4-FFF2-40B4-BE49-F238E27FC236}">
-                <a16:creationId xmlns:a16="http://schemas.microsoft.com/office/drawing/2014/main" xmlns="" id="{6CF8FF9D-8A98-4CFA-94C2-E2074112639C}"/>
+                <a16:creationId xmlns:a16="http://schemas.microsoft.com/office/drawing/2014/main" id="{6CF8FF9D-8A98-4CFA-94C2-E2074112639C}"/>
               </a:ext>
             </a:extLst>
           </p:cNvPr>
@@ -18225,10 +18161,166 @@
           </a:p>
         </p:txBody>
       </p:sp>
+      <p:sp>
+        <p:nvSpPr>
+          <p:cNvPr id="6" name="Textfeld 5">
+            <a:extLst>
+              <a:ext uri="{FF2B5EF4-FFF2-40B4-BE49-F238E27FC236}">
+                <a16:creationId xmlns:a16="http://schemas.microsoft.com/office/drawing/2014/main" id="{8E05CB3E-FC8B-4C84-8452-A027AF29808D}"/>
+              </a:ext>
+            </a:extLst>
+          </p:cNvPr>
+          <p:cNvSpPr txBox="1"/>
+          <p:nvPr/>
+        </p:nvSpPr>
+        <p:spPr>
+          <a:xfrm>
+            <a:off x="485190" y="1154923"/>
+            <a:ext cx="4945791" cy="1323439"/>
+          </a:xfrm>
+          <a:prstGeom prst="rect">
+            <a:avLst/>
+          </a:prstGeom>
+          <a:noFill/>
+        </p:spPr>
+        <p:txBody>
+          <a:bodyPr wrap="square" rtlCol="0">
+            <a:spAutoFit/>
+          </a:bodyPr>
+          <a:lstStyle/>
+          <a:p>
+            <a:r>
+              <a:rPr lang="de-DE" sz="2000" b="1" dirty="0"/>
+              <a:t>3. Tests</a:t>
+            </a:r>
+          </a:p>
+          <a:p>
+            <a:endParaRPr lang="de-DE" sz="2000" b="1" dirty="0"/>
+          </a:p>
+          <a:p>
+            <a:endParaRPr lang="de-DE" sz="2000" b="1" dirty="0"/>
+          </a:p>
+          <a:p>
+            <a:r>
+              <a:rPr lang="de-DE" sz="2000" b="1" dirty="0"/>
+              <a:t> 	</a:t>
+            </a:r>
+            <a:endParaRPr lang="de-DE" sz="2000" dirty="0"/>
+          </a:p>
+        </p:txBody>
+      </p:sp>
+      <p:sp>
+        <p:nvSpPr>
+          <p:cNvPr id="9" name="Textfeld 8">
+            <a:extLst>
+              <a:ext uri="{FF2B5EF4-FFF2-40B4-BE49-F238E27FC236}">
+                <a16:creationId xmlns:a16="http://schemas.microsoft.com/office/drawing/2014/main" id="{105407A1-FCD8-4DB9-8051-366A6497ED37}"/>
+              </a:ext>
+            </a:extLst>
+          </p:cNvPr>
+          <p:cNvSpPr txBox="1"/>
+          <p:nvPr/>
+        </p:nvSpPr>
+        <p:spPr>
+          <a:xfrm>
+            <a:off x="1085461" y="1739968"/>
+            <a:ext cx="10021077" cy="1247008"/>
+          </a:xfrm>
+          <a:prstGeom prst="rect">
+            <a:avLst/>
+          </a:prstGeom>
+          <a:noFill/>
+        </p:spPr>
+        <p:txBody>
+          <a:bodyPr wrap="square">
+            <a:spAutoFit/>
+          </a:bodyPr>
+          <a:lstStyle/>
+          <a:p>
+            <a:pPr>
+              <a:lnSpc>
+                <a:spcPct val="200000"/>
+              </a:lnSpc>
+            </a:pPr>
+            <a:r>
+              <a:rPr lang="de-DE" sz="1600" b="1" dirty="0">
+                <a:solidFill>
+                  <a:srgbClr val="000000"/>
+                </a:solidFill>
+                <a:latin typeface="+mj-lt"/>
+              </a:rPr>
+              <a:t>Memory leak:</a:t>
+            </a:r>
+          </a:p>
+          <a:p>
+            <a:r>
+              <a:rPr lang="de-DE" sz="1600" dirty="0">
+                <a:solidFill>
+                  <a:srgbClr val="000000"/>
+                </a:solidFill>
+                <a:latin typeface="+mj-lt"/>
+              </a:rPr>
+              <a:t>Unser Projekt wurde vollständig auf Memory Leaks geprüft.</a:t>
+            </a:r>
+            <a:endParaRPr lang="de-DE" sz="1600" b="1" dirty="0">
+              <a:solidFill>
+                <a:srgbClr val="000000"/>
+              </a:solidFill>
+              <a:latin typeface="+mj-lt"/>
+            </a:endParaRPr>
+          </a:p>
+          <a:p>
+            <a:pPr>
+              <a:lnSpc>
+                <a:spcPct val="200000"/>
+              </a:lnSpc>
+            </a:pPr>
+            <a:r>
+              <a:rPr lang="de-DE" sz="1600" b="1" dirty="0">
+                <a:solidFill>
+                  <a:srgbClr val="000000"/>
+                </a:solidFill>
+                <a:latin typeface="+mj-lt"/>
+              </a:rPr>
+              <a:t>Unsere Tests:</a:t>
+            </a:r>
+          </a:p>
+        </p:txBody>
+      </p:sp>
+      <p:pic>
+        <p:nvPicPr>
+          <p:cNvPr id="3" name="Grafik 2">
+            <a:extLst>
+              <a:ext uri="{FF2B5EF4-FFF2-40B4-BE49-F238E27FC236}">
+                <a16:creationId xmlns:a16="http://schemas.microsoft.com/office/drawing/2014/main" id="{02FF0FAB-7B84-4149-AE0C-DFA7DF373C07}"/>
+              </a:ext>
+            </a:extLst>
+          </p:cNvPr>
+          <p:cNvPicPr>
+            <a:picLocks noChangeAspect="1"/>
+          </p:cNvPicPr>
+          <p:nvPr/>
+        </p:nvPicPr>
+        <p:blipFill>
+          <a:blip r:embed="rId2"/>
+          <a:stretch>
+            <a:fillRect/>
+          </a:stretch>
+        </p:blipFill>
+        <p:spPr>
+          <a:xfrm>
+            <a:off x="1412977" y="3063407"/>
+            <a:ext cx="4683022" cy="2945657"/>
+          </a:xfrm>
+          <a:prstGeom prst="rect">
+            <a:avLst/>
+          </a:prstGeom>
+        </p:spPr>
+      </p:pic>
     </p:spTree>
     <p:extLst>
       <p:ext uri="{BB962C8B-B14F-4D97-AF65-F5344CB8AC3E}">
-        <p14:creationId xmlns:p14="http://schemas.microsoft.com/office/powerpoint/2010/main" val="1818660360"/>
+        <p14:creationId xmlns:p14="http://schemas.microsoft.com/office/powerpoint/2010/main" val="2145051896"/>
       </p:ext>
     </p:extLst>
   </p:cSld>
@@ -18260,7 +18352,7 @@
           <p:cNvPr id="10" name="Foliennummernplatzhalter 9">
             <a:extLst>
               <a:ext uri="{FF2B5EF4-FFF2-40B4-BE49-F238E27FC236}">
-                <a16:creationId xmlns:a16="http://schemas.microsoft.com/office/drawing/2014/main" xmlns="" id="{D931436D-0B25-4BC2-AB85-D177B4C7ED90}"/>
+                <a16:creationId xmlns:a16="http://schemas.microsoft.com/office/drawing/2014/main" id="{D931436D-0B25-4BC2-AB85-D177B4C7ED90}"/>
               </a:ext>
             </a:extLst>
           </p:cNvPr>
@@ -18310,7 +18402,7 @@
           <p:cNvPr id="12" name="Gerader Verbinder 11">
             <a:extLst>
               <a:ext uri="{FF2B5EF4-FFF2-40B4-BE49-F238E27FC236}">
-                <a16:creationId xmlns:a16="http://schemas.microsoft.com/office/drawing/2014/main" xmlns="" id="{4A855513-E5C1-4F05-A8FD-33AC62C22A5E}"/>
+                <a16:creationId xmlns:a16="http://schemas.microsoft.com/office/drawing/2014/main" id="{4A855513-E5C1-4F05-A8FD-33AC62C22A5E}"/>
               </a:ext>
             </a:extLst>
           </p:cNvPr>
@@ -18351,7 +18443,7 @@
           <p:cNvPr id="13" name="Gerader Verbinder 12">
             <a:extLst>
               <a:ext uri="{FF2B5EF4-FFF2-40B4-BE49-F238E27FC236}">
-                <a16:creationId xmlns:a16="http://schemas.microsoft.com/office/drawing/2014/main" xmlns="" id="{F2778992-5E28-437C-AEA9-F9BBD6E6F5BB}"/>
+                <a16:creationId xmlns:a16="http://schemas.microsoft.com/office/drawing/2014/main" id="{F2778992-5E28-437C-AEA9-F9BBD6E6F5BB}"/>
               </a:ext>
             </a:extLst>
           </p:cNvPr>
@@ -18392,7 +18484,7 @@
           <p:cNvPr id="14" name="Textfeld 13">
             <a:extLst>
               <a:ext uri="{FF2B5EF4-FFF2-40B4-BE49-F238E27FC236}">
-                <a16:creationId xmlns:a16="http://schemas.microsoft.com/office/drawing/2014/main" xmlns="" id="{6CF8FF9D-8A98-4CFA-94C2-E2074112639C}"/>
+                <a16:creationId xmlns:a16="http://schemas.microsoft.com/office/drawing/2014/main" id="{6CF8FF9D-8A98-4CFA-94C2-E2074112639C}"/>
               </a:ext>
             </a:extLst>
           </p:cNvPr>
@@ -18428,7 +18520,7 @@
           <p:cNvPr id="6" name="Textfeld 5">
             <a:extLst>
               <a:ext uri="{FF2B5EF4-FFF2-40B4-BE49-F238E27FC236}">
-                <a16:creationId xmlns:a16="http://schemas.microsoft.com/office/drawing/2014/main" xmlns="" id="{8E05CB3E-FC8B-4C84-8452-A027AF29808D}"/>
+                <a16:creationId xmlns:a16="http://schemas.microsoft.com/office/drawing/2014/main" id="{8E05CB3E-FC8B-4C84-8452-A027AF29808D}"/>
               </a:ext>
             </a:extLst>
           </p:cNvPr>
@@ -18470,7 +18562,7 @@
           <p:cNvPr id="8" name="Textfeld 7">
             <a:extLst>
               <a:ext uri="{FF2B5EF4-FFF2-40B4-BE49-F238E27FC236}">
-                <a16:creationId xmlns:a16="http://schemas.microsoft.com/office/drawing/2014/main" xmlns="" id="{4842BEFA-10C3-45C0-8997-167BE0586DAC}"/>
+                <a16:creationId xmlns:a16="http://schemas.microsoft.com/office/drawing/2014/main" id="{4842BEFA-10C3-45C0-8997-167BE0586DAC}"/>
               </a:ext>
             </a:extLst>
           </p:cNvPr>
@@ -18577,7 +18669,7 @@
           <p:cNvPr id="3" name="Textfeld 2">
             <a:extLst>
               <a:ext uri="{FF2B5EF4-FFF2-40B4-BE49-F238E27FC236}">
-                <a16:creationId xmlns:a16="http://schemas.microsoft.com/office/drawing/2014/main" xmlns="" id="{B616C74B-1A1C-4612-8D7A-608508876D6B}"/>
+                <a16:creationId xmlns:a16="http://schemas.microsoft.com/office/drawing/2014/main" id="{B616C74B-1A1C-4612-8D7A-608508876D6B}"/>
               </a:ext>
             </a:extLst>
           </p:cNvPr>
@@ -18611,6 +18703,625 @@
     <p:extLst>
       <p:ext uri="{BB962C8B-B14F-4D97-AF65-F5344CB8AC3E}">
         <p14:creationId xmlns:p14="http://schemas.microsoft.com/office/powerpoint/2010/main" val="3960827049"/>
+      </p:ext>
+    </p:extLst>
+  </p:cSld>
+  <p:clrMapOvr>
+    <a:masterClrMapping/>
+  </p:clrMapOvr>
+</p:sld>
+</file>
+
+<file path=ppt/slides/slide30.xml><?xml version="1.0" encoding="utf-8"?>
+<p:sld xmlns:a="http://schemas.openxmlformats.org/drawingml/2006/main" xmlns:r="http://schemas.openxmlformats.org/officeDocument/2006/relationships" xmlns:p="http://schemas.openxmlformats.org/presentationml/2006/main">
+  <p:cSld>
+    <p:spTree>
+      <p:nvGrpSpPr>
+        <p:cNvPr id="1" name=""/>
+        <p:cNvGrpSpPr/>
+        <p:nvPr/>
+      </p:nvGrpSpPr>
+      <p:grpSpPr>
+        <a:xfrm>
+          <a:off x="0" y="0"/>
+          <a:ext cx="0" cy="0"/>
+          <a:chOff x="0" y="0"/>
+          <a:chExt cx="0" cy="0"/>
+        </a:xfrm>
+      </p:grpSpPr>
+      <p:sp>
+        <p:nvSpPr>
+          <p:cNvPr id="10" name="Foliennummernplatzhalter 9">
+            <a:extLst>
+              <a:ext uri="{FF2B5EF4-FFF2-40B4-BE49-F238E27FC236}">
+                <a16:creationId xmlns:a16="http://schemas.microsoft.com/office/drawing/2014/main" id="{D931436D-0B25-4BC2-AB85-D177B4C7ED90}"/>
+              </a:ext>
+            </a:extLst>
+          </p:cNvPr>
+          <p:cNvSpPr>
+            <a:spLocks noGrp="1"/>
+          </p:cNvSpPr>
+          <p:nvPr>
+            <p:ph type="sldNum" sz="quarter" idx="12"/>
+          </p:nvPr>
+        </p:nvSpPr>
+        <p:spPr>
+          <a:xfrm>
+            <a:off x="9273076" y="6421667"/>
+            <a:ext cx="2743200" cy="365125"/>
+          </a:xfrm>
+        </p:spPr>
+        <p:txBody>
+          <a:bodyPr/>
+          <a:lstStyle/>
+          <a:p>
+            <a:r>
+              <a:rPr lang="de-DE" sz="1000" b="1" dirty="0">
+                <a:solidFill>
+                  <a:schemeClr val="tx1"/>
+                </a:solidFill>
+              </a:rPr>
+              <a:t>Seite </a:t>
+            </a:r>
+            <a:fld id="{2ACCF16B-2666-47AE-ACDC-C377DF350193}" type="slidenum">
+              <a:rPr lang="de-DE" sz="1000" b="1" smtClean="0">
+                <a:solidFill>
+                  <a:schemeClr val="tx1"/>
+                </a:solidFill>
+              </a:rPr>
+              <a:t>30</a:t>
+            </a:fld>
+            <a:endParaRPr lang="de-DE" sz="1000" b="1" dirty="0">
+              <a:solidFill>
+                <a:schemeClr val="tx1"/>
+              </a:solidFill>
+            </a:endParaRPr>
+          </a:p>
+        </p:txBody>
+      </p:sp>
+      <p:cxnSp>
+        <p:nvCxnSpPr>
+          <p:cNvPr id="12" name="Gerader Verbinder 11">
+            <a:extLst>
+              <a:ext uri="{FF2B5EF4-FFF2-40B4-BE49-F238E27FC236}">
+                <a16:creationId xmlns:a16="http://schemas.microsoft.com/office/drawing/2014/main" id="{4A855513-E5C1-4F05-A8FD-33AC62C22A5E}"/>
+              </a:ext>
+            </a:extLst>
+          </p:cNvPr>
+          <p:cNvCxnSpPr/>
+          <p:nvPr/>
+        </p:nvCxnSpPr>
+        <p:spPr>
+          <a:xfrm>
+            <a:off x="0" y="737118"/>
+            <a:ext cx="12192000" cy="0"/>
+          </a:xfrm>
+          <a:prstGeom prst="line">
+            <a:avLst/>
+          </a:prstGeom>
+          <a:ln w="15875">
+            <a:solidFill>
+              <a:srgbClr val="3333CC"/>
+            </a:solidFill>
+          </a:ln>
+        </p:spPr>
+        <p:style>
+          <a:lnRef idx="1">
+            <a:schemeClr val="accent1"/>
+          </a:lnRef>
+          <a:fillRef idx="0">
+            <a:schemeClr val="accent1"/>
+          </a:fillRef>
+          <a:effectRef idx="0">
+            <a:schemeClr val="accent1"/>
+          </a:effectRef>
+          <a:fontRef idx="minor">
+            <a:schemeClr val="tx1"/>
+          </a:fontRef>
+        </p:style>
+      </p:cxnSp>
+      <p:cxnSp>
+        <p:nvCxnSpPr>
+          <p:cNvPr id="13" name="Gerader Verbinder 12">
+            <a:extLst>
+              <a:ext uri="{FF2B5EF4-FFF2-40B4-BE49-F238E27FC236}">
+                <a16:creationId xmlns:a16="http://schemas.microsoft.com/office/drawing/2014/main" id="{F2778992-5E28-437C-AEA9-F9BBD6E6F5BB}"/>
+              </a:ext>
+            </a:extLst>
+          </p:cNvPr>
+          <p:cNvCxnSpPr/>
+          <p:nvPr/>
+        </p:nvCxnSpPr>
+        <p:spPr>
+          <a:xfrm>
+            <a:off x="0" y="6356350"/>
+            <a:ext cx="12192000" cy="0"/>
+          </a:xfrm>
+          <a:prstGeom prst="line">
+            <a:avLst/>
+          </a:prstGeom>
+          <a:ln w="15875">
+            <a:solidFill>
+              <a:srgbClr val="3333CC"/>
+            </a:solidFill>
+          </a:ln>
+        </p:spPr>
+        <p:style>
+          <a:lnRef idx="1">
+            <a:schemeClr val="accent1"/>
+          </a:lnRef>
+          <a:fillRef idx="0">
+            <a:schemeClr val="accent1"/>
+          </a:fillRef>
+          <a:effectRef idx="0">
+            <a:schemeClr val="accent1"/>
+          </a:effectRef>
+          <a:fontRef idx="minor">
+            <a:schemeClr val="tx1"/>
+          </a:fontRef>
+        </p:style>
+      </p:cxnSp>
+      <p:sp>
+        <p:nvSpPr>
+          <p:cNvPr id="14" name="Textfeld 13">
+            <a:extLst>
+              <a:ext uri="{FF2B5EF4-FFF2-40B4-BE49-F238E27FC236}">
+                <a16:creationId xmlns:a16="http://schemas.microsoft.com/office/drawing/2014/main" id="{6CF8FF9D-8A98-4CFA-94C2-E2074112639C}"/>
+              </a:ext>
+            </a:extLst>
+          </p:cNvPr>
+          <p:cNvSpPr txBox="1"/>
+          <p:nvPr/>
+        </p:nvSpPr>
+        <p:spPr>
+          <a:xfrm>
+            <a:off x="2653004" y="215779"/>
+            <a:ext cx="6885992" cy="369332"/>
+          </a:xfrm>
+          <a:prstGeom prst="rect">
+            <a:avLst/>
+          </a:prstGeom>
+          <a:noFill/>
+        </p:spPr>
+        <p:txBody>
+          <a:bodyPr wrap="square" rtlCol="0">
+            <a:spAutoFit/>
+          </a:bodyPr>
+          <a:lstStyle/>
+          <a:p>
+            <a:pPr algn="ctr"/>
+            <a:r>
+              <a:rPr lang="de-DE" b="1" dirty="0"/>
+              <a:t>Dynamische Container in C</a:t>
+            </a:r>
+          </a:p>
+        </p:txBody>
+      </p:sp>
+      <p:sp>
+        <p:nvSpPr>
+          <p:cNvPr id="6" name="Textfeld 5">
+            <a:extLst>
+              <a:ext uri="{FF2B5EF4-FFF2-40B4-BE49-F238E27FC236}">
+                <a16:creationId xmlns:a16="http://schemas.microsoft.com/office/drawing/2014/main" id="{8E05CB3E-FC8B-4C84-8452-A027AF29808D}"/>
+              </a:ext>
+            </a:extLst>
+          </p:cNvPr>
+          <p:cNvSpPr txBox="1"/>
+          <p:nvPr/>
+        </p:nvSpPr>
+        <p:spPr>
+          <a:xfrm>
+            <a:off x="485190" y="1154923"/>
+            <a:ext cx="4945791" cy="1323439"/>
+          </a:xfrm>
+          <a:prstGeom prst="rect">
+            <a:avLst/>
+          </a:prstGeom>
+          <a:noFill/>
+        </p:spPr>
+        <p:txBody>
+          <a:bodyPr wrap="square" rtlCol="0">
+            <a:spAutoFit/>
+          </a:bodyPr>
+          <a:lstStyle/>
+          <a:p>
+            <a:r>
+              <a:rPr lang="de-DE" sz="2000" b="1" dirty="0"/>
+              <a:t>4. Kompilierung</a:t>
+            </a:r>
+          </a:p>
+          <a:p>
+            <a:endParaRPr lang="de-DE" sz="2000" b="1" dirty="0"/>
+          </a:p>
+          <a:p>
+            <a:endParaRPr lang="de-DE" sz="2000" b="1" dirty="0"/>
+          </a:p>
+          <a:p>
+            <a:r>
+              <a:rPr lang="de-DE" sz="2000" b="1" dirty="0"/>
+              <a:t> 	</a:t>
+            </a:r>
+            <a:endParaRPr lang="de-DE" sz="2000" dirty="0"/>
+          </a:p>
+        </p:txBody>
+      </p:sp>
+      <p:sp>
+        <p:nvSpPr>
+          <p:cNvPr id="8" name="Textfeld 7">
+            <a:extLst>
+              <a:ext uri="{FF2B5EF4-FFF2-40B4-BE49-F238E27FC236}">
+                <a16:creationId xmlns:a16="http://schemas.microsoft.com/office/drawing/2014/main" id="{4842BEFA-10C3-45C0-8997-167BE0586DAC}"/>
+              </a:ext>
+            </a:extLst>
+          </p:cNvPr>
+          <p:cNvSpPr txBox="1"/>
+          <p:nvPr/>
+        </p:nvSpPr>
+        <p:spPr>
+          <a:xfrm>
+            <a:off x="783771" y="1945319"/>
+            <a:ext cx="10021077" cy="3046988"/>
+          </a:xfrm>
+          <a:prstGeom prst="rect">
+            <a:avLst/>
+          </a:prstGeom>
+          <a:noFill/>
+        </p:spPr>
+        <p:txBody>
+          <a:bodyPr wrap="square">
+            <a:spAutoFit/>
+          </a:bodyPr>
+          <a:lstStyle/>
+          <a:p>
+            <a:pPr>
+              <a:lnSpc>
+                <a:spcPct val="200000"/>
+              </a:lnSpc>
+            </a:pPr>
+            <a:r>
+              <a:rPr lang="de-DE" sz="1600" b="1" dirty="0">
+                <a:solidFill>
+                  <a:srgbClr val="000000"/>
+                </a:solidFill>
+                <a:latin typeface="+mj-lt"/>
+              </a:rPr>
+              <a:t>Windows:</a:t>
+            </a:r>
+          </a:p>
+          <a:p>
+            <a:r>
+              <a:rPr lang="de-DE" sz="1600" dirty="0">
+                <a:solidFill>
+                  <a:srgbClr val="000000"/>
+                </a:solidFill>
+                <a:latin typeface="+mj-lt"/>
+              </a:rPr>
+              <a:t>Öffne das Projekt in Visual Studio und klicke das Test-Projekt und wähle es als Start-Projekt aus. Ohne diese Einstellung wird möglicherweise versuch eine .</a:t>
+            </a:r>
+            <a:r>
+              <a:rPr lang="de-DE" sz="1600" dirty="0" err="1">
+                <a:solidFill>
+                  <a:srgbClr val="000000"/>
+                </a:solidFill>
+                <a:latin typeface="+mj-lt"/>
+              </a:rPr>
+              <a:t>lib</a:t>
+            </a:r>
+            <a:r>
+              <a:rPr lang="de-DE" sz="1600" dirty="0">
+                <a:solidFill>
+                  <a:srgbClr val="000000"/>
+                </a:solidFill>
+                <a:latin typeface="+mj-lt"/>
+              </a:rPr>
+              <a:t> Datei zu öffnen, dort wird dann ein Fehler angezeigt.</a:t>
+            </a:r>
+          </a:p>
+          <a:p>
+            <a:endParaRPr lang="de-DE" sz="1600" dirty="0">
+              <a:solidFill>
+                <a:srgbClr val="000000"/>
+              </a:solidFill>
+              <a:latin typeface="+mj-lt"/>
+            </a:endParaRPr>
+          </a:p>
+          <a:p>
+            <a:pPr>
+              <a:lnSpc>
+                <a:spcPct val="200000"/>
+              </a:lnSpc>
+            </a:pPr>
+            <a:r>
+              <a:rPr lang="de-DE" sz="1600" b="1" dirty="0">
+                <a:solidFill>
+                  <a:srgbClr val="000000"/>
+                </a:solidFill>
+                <a:latin typeface="+mj-lt"/>
+              </a:rPr>
+              <a:t>Linux:</a:t>
+            </a:r>
+          </a:p>
+          <a:p>
+            <a:r>
+              <a:rPr lang="de-DE" sz="1600" dirty="0">
+                <a:solidFill>
+                  <a:srgbClr val="000000"/>
+                </a:solidFill>
+                <a:latin typeface="+mj-lt"/>
+              </a:rPr>
+              <a:t>Navigiere zu der </a:t>
+            </a:r>
+            <a:r>
+              <a:rPr lang="de-DE" sz="1600" dirty="0" err="1">
+                <a:solidFill>
+                  <a:srgbClr val="000000"/>
+                </a:solidFill>
+                <a:latin typeface="+mj-lt"/>
+              </a:rPr>
+              <a:t>makefile</a:t>
+            </a:r>
+            <a:r>
+              <a:rPr lang="de-DE" sz="1600" dirty="0">
+                <a:solidFill>
+                  <a:srgbClr val="000000"/>
+                </a:solidFill>
+                <a:latin typeface="+mj-lt"/>
+              </a:rPr>
+              <a:t>. Dort befindet sich auch ein Skript das zum kompilieren genutzt werden kann. Es erstellt einen bin Order für Temporäre Daten, danach kompiliert es und startet das fertige Programm danach.</a:t>
+            </a:r>
+          </a:p>
+          <a:p>
+            <a:r>
+              <a:rPr lang="de-DE" sz="1600" dirty="0">
+                <a:solidFill>
+                  <a:srgbClr val="000000"/>
+                </a:solidFill>
+                <a:latin typeface="+mj-lt"/>
+              </a:rPr>
+              <a:t>Vergiss nicht die Skript-Datei ausführbar zu machen mit </a:t>
+            </a:r>
+            <a:r>
+              <a:rPr lang="de-DE" sz="1600" dirty="0" err="1">
+                <a:solidFill>
+                  <a:srgbClr val="000000"/>
+                </a:solidFill>
+                <a:latin typeface="+mj-lt"/>
+              </a:rPr>
+              <a:t>chmod</a:t>
+            </a:r>
+            <a:r>
+              <a:rPr lang="de-DE" sz="1600" dirty="0">
+                <a:solidFill>
+                  <a:srgbClr val="000000"/>
+                </a:solidFill>
+                <a:latin typeface="+mj-lt"/>
+              </a:rPr>
+              <a:t> +x FileName.sh. </a:t>
+            </a:r>
+          </a:p>
+          <a:p>
+            <a:r>
+              <a:rPr lang="de-DE" sz="1600" dirty="0">
+                <a:solidFill>
+                  <a:srgbClr val="000000"/>
+                </a:solidFill>
+                <a:latin typeface="+mj-lt"/>
+              </a:rPr>
+              <a:t>Dann zum Öffnen ./Filename.sh</a:t>
+            </a:r>
+          </a:p>
+          <a:p>
+            <a:endParaRPr lang="de-DE" sz="1600" b="0" i="0" u="none" strike="noStrike" baseline="0" dirty="0">
+              <a:solidFill>
+                <a:srgbClr val="000000"/>
+              </a:solidFill>
+              <a:latin typeface="+mj-lt"/>
+            </a:endParaRPr>
+          </a:p>
+        </p:txBody>
+      </p:sp>
+    </p:spTree>
+    <p:extLst>
+      <p:ext uri="{BB962C8B-B14F-4D97-AF65-F5344CB8AC3E}">
+        <p14:creationId xmlns:p14="http://schemas.microsoft.com/office/powerpoint/2010/main" val="2796430297"/>
+      </p:ext>
+    </p:extLst>
+  </p:cSld>
+  <p:clrMapOvr>
+    <a:masterClrMapping/>
+  </p:clrMapOvr>
+</p:sld>
+</file>
+
+<file path=ppt/slides/slide31.xml><?xml version="1.0" encoding="utf-8"?>
+<p:sld xmlns:a="http://schemas.openxmlformats.org/drawingml/2006/main" xmlns:r="http://schemas.openxmlformats.org/officeDocument/2006/relationships" xmlns:p="http://schemas.openxmlformats.org/presentationml/2006/main">
+  <p:cSld>
+    <p:spTree>
+      <p:nvGrpSpPr>
+        <p:cNvPr id="1" name=""/>
+        <p:cNvGrpSpPr/>
+        <p:nvPr/>
+      </p:nvGrpSpPr>
+      <p:grpSpPr>
+        <a:xfrm>
+          <a:off x="0" y="0"/>
+          <a:ext cx="0" cy="0"/>
+          <a:chOff x="0" y="0"/>
+          <a:chExt cx="0" cy="0"/>
+        </a:xfrm>
+      </p:grpSpPr>
+      <p:sp>
+        <p:nvSpPr>
+          <p:cNvPr id="10" name="Foliennummernplatzhalter 9">
+            <a:extLst>
+              <a:ext uri="{FF2B5EF4-FFF2-40B4-BE49-F238E27FC236}">
+                <a16:creationId xmlns:a16="http://schemas.microsoft.com/office/drawing/2014/main" id="{D931436D-0B25-4BC2-AB85-D177B4C7ED90}"/>
+              </a:ext>
+            </a:extLst>
+          </p:cNvPr>
+          <p:cNvSpPr>
+            <a:spLocks noGrp="1"/>
+          </p:cNvSpPr>
+          <p:nvPr>
+            <p:ph type="sldNum" sz="quarter" idx="12"/>
+          </p:nvPr>
+        </p:nvSpPr>
+        <p:spPr>
+          <a:xfrm>
+            <a:off x="9273076" y="6421667"/>
+            <a:ext cx="2743200" cy="365125"/>
+          </a:xfrm>
+        </p:spPr>
+        <p:txBody>
+          <a:bodyPr/>
+          <a:lstStyle/>
+          <a:p>
+            <a:r>
+              <a:rPr lang="de-DE" sz="1000" b="1" dirty="0">
+                <a:solidFill>
+                  <a:schemeClr val="tx1"/>
+                </a:solidFill>
+              </a:rPr>
+              <a:t>Seite </a:t>
+            </a:r>
+            <a:fld id="{2ACCF16B-2666-47AE-ACDC-C377DF350193}" type="slidenum">
+              <a:rPr lang="de-DE" sz="1000" b="1" smtClean="0">
+                <a:solidFill>
+                  <a:schemeClr val="tx1"/>
+                </a:solidFill>
+              </a:rPr>
+              <a:t>31</a:t>
+            </a:fld>
+            <a:endParaRPr lang="de-DE" sz="1000" b="1" dirty="0">
+              <a:solidFill>
+                <a:schemeClr val="tx1"/>
+              </a:solidFill>
+            </a:endParaRPr>
+          </a:p>
+        </p:txBody>
+      </p:sp>
+      <p:cxnSp>
+        <p:nvCxnSpPr>
+          <p:cNvPr id="12" name="Gerader Verbinder 11">
+            <a:extLst>
+              <a:ext uri="{FF2B5EF4-FFF2-40B4-BE49-F238E27FC236}">
+                <a16:creationId xmlns:a16="http://schemas.microsoft.com/office/drawing/2014/main" id="{4A855513-E5C1-4F05-A8FD-33AC62C22A5E}"/>
+              </a:ext>
+            </a:extLst>
+          </p:cNvPr>
+          <p:cNvCxnSpPr/>
+          <p:nvPr/>
+        </p:nvCxnSpPr>
+        <p:spPr>
+          <a:xfrm>
+            <a:off x="0" y="737118"/>
+            <a:ext cx="12192000" cy="0"/>
+          </a:xfrm>
+          <a:prstGeom prst="line">
+            <a:avLst/>
+          </a:prstGeom>
+          <a:ln w="15875">
+            <a:solidFill>
+              <a:srgbClr val="3333CC"/>
+            </a:solidFill>
+          </a:ln>
+        </p:spPr>
+        <p:style>
+          <a:lnRef idx="1">
+            <a:schemeClr val="accent1"/>
+          </a:lnRef>
+          <a:fillRef idx="0">
+            <a:schemeClr val="accent1"/>
+          </a:fillRef>
+          <a:effectRef idx="0">
+            <a:schemeClr val="accent1"/>
+          </a:effectRef>
+          <a:fontRef idx="minor">
+            <a:schemeClr val="tx1"/>
+          </a:fontRef>
+        </p:style>
+      </p:cxnSp>
+      <p:cxnSp>
+        <p:nvCxnSpPr>
+          <p:cNvPr id="13" name="Gerader Verbinder 12">
+            <a:extLst>
+              <a:ext uri="{FF2B5EF4-FFF2-40B4-BE49-F238E27FC236}">
+                <a16:creationId xmlns:a16="http://schemas.microsoft.com/office/drawing/2014/main" id="{F2778992-5E28-437C-AEA9-F9BBD6E6F5BB}"/>
+              </a:ext>
+            </a:extLst>
+          </p:cNvPr>
+          <p:cNvCxnSpPr/>
+          <p:nvPr/>
+        </p:nvCxnSpPr>
+        <p:spPr>
+          <a:xfrm>
+            <a:off x="0" y="6356350"/>
+            <a:ext cx="12192000" cy="0"/>
+          </a:xfrm>
+          <a:prstGeom prst="line">
+            <a:avLst/>
+          </a:prstGeom>
+          <a:ln w="15875">
+            <a:solidFill>
+              <a:srgbClr val="3333CC"/>
+            </a:solidFill>
+          </a:ln>
+        </p:spPr>
+        <p:style>
+          <a:lnRef idx="1">
+            <a:schemeClr val="accent1"/>
+          </a:lnRef>
+          <a:fillRef idx="0">
+            <a:schemeClr val="accent1"/>
+          </a:fillRef>
+          <a:effectRef idx="0">
+            <a:schemeClr val="accent1"/>
+          </a:effectRef>
+          <a:fontRef idx="minor">
+            <a:schemeClr val="tx1"/>
+          </a:fontRef>
+        </p:style>
+      </p:cxnSp>
+      <p:sp>
+        <p:nvSpPr>
+          <p:cNvPr id="14" name="Textfeld 13">
+            <a:extLst>
+              <a:ext uri="{FF2B5EF4-FFF2-40B4-BE49-F238E27FC236}">
+                <a16:creationId xmlns:a16="http://schemas.microsoft.com/office/drawing/2014/main" id="{6CF8FF9D-8A98-4CFA-94C2-E2074112639C}"/>
+              </a:ext>
+            </a:extLst>
+          </p:cNvPr>
+          <p:cNvSpPr txBox="1"/>
+          <p:nvPr/>
+        </p:nvSpPr>
+        <p:spPr>
+          <a:xfrm>
+            <a:off x="2653004" y="215779"/>
+            <a:ext cx="6885992" cy="369332"/>
+          </a:xfrm>
+          <a:prstGeom prst="rect">
+            <a:avLst/>
+          </a:prstGeom>
+          <a:noFill/>
+        </p:spPr>
+        <p:txBody>
+          <a:bodyPr wrap="square" rtlCol="0">
+            <a:spAutoFit/>
+          </a:bodyPr>
+          <a:lstStyle/>
+          <a:p>
+            <a:pPr algn="ctr"/>
+            <a:r>
+              <a:rPr lang="de-DE" b="1" dirty="0"/>
+              <a:t>Dynamische Container in C</a:t>
+            </a:r>
+          </a:p>
+        </p:txBody>
+      </p:sp>
+    </p:spTree>
+    <p:extLst>
+      <p:ext uri="{BB962C8B-B14F-4D97-AF65-F5344CB8AC3E}">
+        <p14:creationId xmlns:p14="http://schemas.microsoft.com/office/powerpoint/2010/main" val="1818660360"/>
       </p:ext>
     </p:extLst>
   </p:cSld>
@@ -18642,7 +19353,7 @@
           <p:cNvPr id="10" name="Foliennummernplatzhalter 9">
             <a:extLst>
               <a:ext uri="{FF2B5EF4-FFF2-40B4-BE49-F238E27FC236}">
-                <a16:creationId xmlns:a16="http://schemas.microsoft.com/office/drawing/2014/main" xmlns="" id="{D931436D-0B25-4BC2-AB85-D177B4C7ED90}"/>
+                <a16:creationId xmlns:a16="http://schemas.microsoft.com/office/drawing/2014/main" id="{D931436D-0B25-4BC2-AB85-D177B4C7ED90}"/>
               </a:ext>
             </a:extLst>
           </p:cNvPr>
@@ -18692,7 +19403,7 @@
           <p:cNvPr id="12" name="Gerader Verbinder 11">
             <a:extLst>
               <a:ext uri="{FF2B5EF4-FFF2-40B4-BE49-F238E27FC236}">
-                <a16:creationId xmlns:a16="http://schemas.microsoft.com/office/drawing/2014/main" xmlns="" id="{4A855513-E5C1-4F05-A8FD-33AC62C22A5E}"/>
+                <a16:creationId xmlns:a16="http://schemas.microsoft.com/office/drawing/2014/main" id="{4A855513-E5C1-4F05-A8FD-33AC62C22A5E}"/>
               </a:ext>
             </a:extLst>
           </p:cNvPr>
@@ -18733,7 +19444,7 @@
           <p:cNvPr id="13" name="Gerader Verbinder 12">
             <a:extLst>
               <a:ext uri="{FF2B5EF4-FFF2-40B4-BE49-F238E27FC236}">
-                <a16:creationId xmlns:a16="http://schemas.microsoft.com/office/drawing/2014/main" xmlns="" id="{F2778992-5E28-437C-AEA9-F9BBD6E6F5BB}"/>
+                <a16:creationId xmlns:a16="http://schemas.microsoft.com/office/drawing/2014/main" id="{F2778992-5E28-437C-AEA9-F9BBD6E6F5BB}"/>
               </a:ext>
             </a:extLst>
           </p:cNvPr>
@@ -18774,7 +19485,7 @@
           <p:cNvPr id="14" name="Textfeld 13">
             <a:extLst>
               <a:ext uri="{FF2B5EF4-FFF2-40B4-BE49-F238E27FC236}">
-                <a16:creationId xmlns:a16="http://schemas.microsoft.com/office/drawing/2014/main" xmlns="" id="{6CF8FF9D-8A98-4CFA-94C2-E2074112639C}"/>
+                <a16:creationId xmlns:a16="http://schemas.microsoft.com/office/drawing/2014/main" id="{6CF8FF9D-8A98-4CFA-94C2-E2074112639C}"/>
               </a:ext>
             </a:extLst>
           </p:cNvPr>
@@ -18810,7 +19521,7 @@
           <p:cNvPr id="6" name="Textfeld 5">
             <a:extLst>
               <a:ext uri="{FF2B5EF4-FFF2-40B4-BE49-F238E27FC236}">
-                <a16:creationId xmlns:a16="http://schemas.microsoft.com/office/drawing/2014/main" xmlns="" id="{8E05CB3E-FC8B-4C84-8452-A027AF29808D}"/>
+                <a16:creationId xmlns:a16="http://schemas.microsoft.com/office/drawing/2014/main" id="{8E05CB3E-FC8B-4C84-8452-A027AF29808D}"/>
               </a:ext>
             </a:extLst>
           </p:cNvPr>
@@ -18852,7 +19563,7 @@
           <p:cNvPr id="8" name="Textfeld 7">
             <a:extLst>
               <a:ext uri="{FF2B5EF4-FFF2-40B4-BE49-F238E27FC236}">
-                <a16:creationId xmlns:a16="http://schemas.microsoft.com/office/drawing/2014/main" xmlns="" id="{4842BEFA-10C3-45C0-8997-167BE0586DAC}"/>
+                <a16:creationId xmlns:a16="http://schemas.microsoft.com/office/drawing/2014/main" id="{4842BEFA-10C3-45C0-8997-167BE0586DAC}"/>
               </a:ext>
             </a:extLst>
           </p:cNvPr>
@@ -18911,7 +19622,7 @@
           <p:cNvPr id="3" name="Textfeld 2">
             <a:extLst>
               <a:ext uri="{FF2B5EF4-FFF2-40B4-BE49-F238E27FC236}">
-                <a16:creationId xmlns:a16="http://schemas.microsoft.com/office/drawing/2014/main" xmlns="" id="{B616C74B-1A1C-4612-8D7A-608508876D6B}"/>
+                <a16:creationId xmlns:a16="http://schemas.microsoft.com/office/drawing/2014/main" id="{B616C74B-1A1C-4612-8D7A-608508876D6B}"/>
               </a:ext>
             </a:extLst>
           </p:cNvPr>
@@ -18946,10 +19657,10 @@
           <p:cNvPr id="4" name="Grafik 3">
             <a:extLst>
               <a:ext uri="{FF2B5EF4-FFF2-40B4-BE49-F238E27FC236}">
-                <a16:creationId xmlns:a16="http://schemas.microsoft.com/office/drawing/2014/main" xmlns="" id="{18938379-4D21-4DC3-9DFE-4CE90527DD2F}"/>
+                <a16:creationId xmlns:a16="http://schemas.microsoft.com/office/drawing/2014/main" id="{18938379-4D21-4DC3-9DFE-4CE90527DD2F}"/>
               </a:ext>
               <a:ext uri="{C183D7F6-B498-43B3-948B-1728B52AA6E4}">
-                <adec:decorative xmlns:adec="http://schemas.microsoft.com/office/drawing/2017/decorative" xmlns="" val="0"/>
+                <adec:decorative xmlns:adec="http://schemas.microsoft.com/office/drawing/2017/decorative" val="0"/>
               </a:ext>
             </a:extLst>
           </p:cNvPr>
@@ -18979,7 +19690,7 @@
           <p:cNvPr id="18" name="Grafik 17">
             <a:extLst>
               <a:ext uri="{FF2B5EF4-FFF2-40B4-BE49-F238E27FC236}">
-                <a16:creationId xmlns:a16="http://schemas.microsoft.com/office/drawing/2014/main" xmlns="" id="{FEB27C32-4E21-40FF-95F0-06C23EE6D5BA}"/>
+                <a16:creationId xmlns:a16="http://schemas.microsoft.com/office/drawing/2014/main" id="{FEB27C32-4E21-40FF-95F0-06C23EE6D5BA}"/>
               </a:ext>
             </a:extLst>
           </p:cNvPr>
@@ -19039,7 +19750,7 @@
           <p:cNvPr id="10" name="Foliennummernplatzhalter 9">
             <a:extLst>
               <a:ext uri="{FF2B5EF4-FFF2-40B4-BE49-F238E27FC236}">
-                <a16:creationId xmlns:a16="http://schemas.microsoft.com/office/drawing/2014/main" xmlns="" id="{D931436D-0B25-4BC2-AB85-D177B4C7ED90}"/>
+                <a16:creationId xmlns:a16="http://schemas.microsoft.com/office/drawing/2014/main" id="{D931436D-0B25-4BC2-AB85-D177B4C7ED90}"/>
               </a:ext>
             </a:extLst>
           </p:cNvPr>
@@ -19089,7 +19800,7 @@
           <p:cNvPr id="12" name="Gerader Verbinder 11">
             <a:extLst>
               <a:ext uri="{FF2B5EF4-FFF2-40B4-BE49-F238E27FC236}">
-                <a16:creationId xmlns:a16="http://schemas.microsoft.com/office/drawing/2014/main" xmlns="" id="{4A855513-E5C1-4F05-A8FD-33AC62C22A5E}"/>
+                <a16:creationId xmlns:a16="http://schemas.microsoft.com/office/drawing/2014/main" id="{4A855513-E5C1-4F05-A8FD-33AC62C22A5E}"/>
               </a:ext>
             </a:extLst>
           </p:cNvPr>
@@ -19130,7 +19841,7 @@
           <p:cNvPr id="13" name="Gerader Verbinder 12">
             <a:extLst>
               <a:ext uri="{FF2B5EF4-FFF2-40B4-BE49-F238E27FC236}">
-                <a16:creationId xmlns:a16="http://schemas.microsoft.com/office/drawing/2014/main" xmlns="" id="{F2778992-5E28-437C-AEA9-F9BBD6E6F5BB}"/>
+                <a16:creationId xmlns:a16="http://schemas.microsoft.com/office/drawing/2014/main" id="{F2778992-5E28-437C-AEA9-F9BBD6E6F5BB}"/>
               </a:ext>
             </a:extLst>
           </p:cNvPr>
@@ -19171,7 +19882,7 @@
           <p:cNvPr id="14" name="Textfeld 13">
             <a:extLst>
               <a:ext uri="{FF2B5EF4-FFF2-40B4-BE49-F238E27FC236}">
-                <a16:creationId xmlns:a16="http://schemas.microsoft.com/office/drawing/2014/main" xmlns="" id="{6CF8FF9D-8A98-4CFA-94C2-E2074112639C}"/>
+                <a16:creationId xmlns:a16="http://schemas.microsoft.com/office/drawing/2014/main" id="{6CF8FF9D-8A98-4CFA-94C2-E2074112639C}"/>
               </a:ext>
             </a:extLst>
           </p:cNvPr>
@@ -19207,7 +19918,7 @@
           <p:cNvPr id="6" name="Textfeld 5">
             <a:extLst>
               <a:ext uri="{FF2B5EF4-FFF2-40B4-BE49-F238E27FC236}">
-                <a16:creationId xmlns:a16="http://schemas.microsoft.com/office/drawing/2014/main" xmlns="" id="{8E05CB3E-FC8B-4C84-8452-A027AF29808D}"/>
+                <a16:creationId xmlns:a16="http://schemas.microsoft.com/office/drawing/2014/main" id="{8E05CB3E-FC8B-4C84-8452-A027AF29808D}"/>
               </a:ext>
             </a:extLst>
           </p:cNvPr>
@@ -19249,7 +19960,7 @@
           <p:cNvPr id="8" name="Textfeld 7">
             <a:extLst>
               <a:ext uri="{FF2B5EF4-FFF2-40B4-BE49-F238E27FC236}">
-                <a16:creationId xmlns:a16="http://schemas.microsoft.com/office/drawing/2014/main" xmlns="" id="{4842BEFA-10C3-45C0-8997-167BE0586DAC}"/>
+                <a16:creationId xmlns:a16="http://schemas.microsoft.com/office/drawing/2014/main" id="{4842BEFA-10C3-45C0-8997-167BE0586DAC}"/>
               </a:ext>
             </a:extLst>
           </p:cNvPr>
@@ -19289,7 +20000,7 @@
           <p:cNvPr id="3" name="Textfeld 2">
             <a:extLst>
               <a:ext uri="{FF2B5EF4-FFF2-40B4-BE49-F238E27FC236}">
-                <a16:creationId xmlns:a16="http://schemas.microsoft.com/office/drawing/2014/main" xmlns="" id="{B616C74B-1A1C-4612-8D7A-608508876D6B}"/>
+                <a16:creationId xmlns:a16="http://schemas.microsoft.com/office/drawing/2014/main" id="{B616C74B-1A1C-4612-8D7A-608508876D6B}"/>
               </a:ext>
             </a:extLst>
           </p:cNvPr>
@@ -19324,7 +20035,7 @@
           <p:cNvPr id="9" name="Grafik 8">
             <a:extLst>
               <a:ext uri="{FF2B5EF4-FFF2-40B4-BE49-F238E27FC236}">
-                <a16:creationId xmlns:a16="http://schemas.microsoft.com/office/drawing/2014/main" xmlns="" id="{FE433633-AAB8-4AC8-80DF-33EE4B97A434}"/>
+                <a16:creationId xmlns:a16="http://schemas.microsoft.com/office/drawing/2014/main" id="{FE433633-AAB8-4AC8-80DF-33EE4B97A434}"/>
               </a:ext>
             </a:extLst>
           </p:cNvPr>
@@ -19384,7 +20095,7 @@
           <p:cNvPr id="10" name="Foliennummernplatzhalter 9">
             <a:extLst>
               <a:ext uri="{FF2B5EF4-FFF2-40B4-BE49-F238E27FC236}">
-                <a16:creationId xmlns:a16="http://schemas.microsoft.com/office/drawing/2014/main" xmlns="" id="{D931436D-0B25-4BC2-AB85-D177B4C7ED90}"/>
+                <a16:creationId xmlns:a16="http://schemas.microsoft.com/office/drawing/2014/main" id="{D931436D-0B25-4BC2-AB85-D177B4C7ED90}"/>
               </a:ext>
             </a:extLst>
           </p:cNvPr>
@@ -19434,7 +20145,7 @@
           <p:cNvPr id="12" name="Gerader Verbinder 11">
             <a:extLst>
               <a:ext uri="{FF2B5EF4-FFF2-40B4-BE49-F238E27FC236}">
-                <a16:creationId xmlns:a16="http://schemas.microsoft.com/office/drawing/2014/main" xmlns="" id="{4A855513-E5C1-4F05-A8FD-33AC62C22A5E}"/>
+                <a16:creationId xmlns:a16="http://schemas.microsoft.com/office/drawing/2014/main" id="{4A855513-E5C1-4F05-A8FD-33AC62C22A5E}"/>
               </a:ext>
             </a:extLst>
           </p:cNvPr>
@@ -19475,7 +20186,7 @@
           <p:cNvPr id="13" name="Gerader Verbinder 12">
             <a:extLst>
               <a:ext uri="{FF2B5EF4-FFF2-40B4-BE49-F238E27FC236}">
-                <a16:creationId xmlns:a16="http://schemas.microsoft.com/office/drawing/2014/main" xmlns="" id="{F2778992-5E28-437C-AEA9-F9BBD6E6F5BB}"/>
+                <a16:creationId xmlns:a16="http://schemas.microsoft.com/office/drawing/2014/main" id="{F2778992-5E28-437C-AEA9-F9BBD6E6F5BB}"/>
               </a:ext>
             </a:extLst>
           </p:cNvPr>
@@ -19516,7 +20227,7 @@
           <p:cNvPr id="14" name="Textfeld 13">
             <a:extLst>
               <a:ext uri="{FF2B5EF4-FFF2-40B4-BE49-F238E27FC236}">
-                <a16:creationId xmlns:a16="http://schemas.microsoft.com/office/drawing/2014/main" xmlns="" id="{6CF8FF9D-8A98-4CFA-94C2-E2074112639C}"/>
+                <a16:creationId xmlns:a16="http://schemas.microsoft.com/office/drawing/2014/main" id="{6CF8FF9D-8A98-4CFA-94C2-E2074112639C}"/>
               </a:ext>
             </a:extLst>
           </p:cNvPr>
@@ -19552,7 +20263,7 @@
           <p:cNvPr id="6" name="Textfeld 5">
             <a:extLst>
               <a:ext uri="{FF2B5EF4-FFF2-40B4-BE49-F238E27FC236}">
-                <a16:creationId xmlns:a16="http://schemas.microsoft.com/office/drawing/2014/main" xmlns="" id="{8E05CB3E-FC8B-4C84-8452-A027AF29808D}"/>
+                <a16:creationId xmlns:a16="http://schemas.microsoft.com/office/drawing/2014/main" id="{8E05CB3E-FC8B-4C84-8452-A027AF29808D}"/>
               </a:ext>
             </a:extLst>
           </p:cNvPr>
@@ -19594,7 +20305,7 @@
           <p:cNvPr id="8" name="Textfeld 7">
             <a:extLst>
               <a:ext uri="{FF2B5EF4-FFF2-40B4-BE49-F238E27FC236}">
-                <a16:creationId xmlns:a16="http://schemas.microsoft.com/office/drawing/2014/main" xmlns="" id="{4842BEFA-10C3-45C0-8997-167BE0586DAC}"/>
+                <a16:creationId xmlns:a16="http://schemas.microsoft.com/office/drawing/2014/main" id="{4842BEFA-10C3-45C0-8997-167BE0586DAC}"/>
               </a:ext>
             </a:extLst>
           </p:cNvPr>
@@ -19697,7 +20408,7 @@
           <p:cNvPr id="3" name="Textfeld 2">
             <a:extLst>
               <a:ext uri="{FF2B5EF4-FFF2-40B4-BE49-F238E27FC236}">
-                <a16:creationId xmlns:a16="http://schemas.microsoft.com/office/drawing/2014/main" xmlns="" id="{B616C74B-1A1C-4612-8D7A-608508876D6B}"/>
+                <a16:creationId xmlns:a16="http://schemas.microsoft.com/office/drawing/2014/main" id="{B616C74B-1A1C-4612-8D7A-608508876D6B}"/>
               </a:ext>
             </a:extLst>
           </p:cNvPr>
@@ -19732,7 +20443,7 @@
           <p:cNvPr id="5" name="Grafik 4">
             <a:extLst>
               <a:ext uri="{FF2B5EF4-FFF2-40B4-BE49-F238E27FC236}">
-                <a16:creationId xmlns:a16="http://schemas.microsoft.com/office/drawing/2014/main" xmlns="" id="{6954ED34-E542-4C7A-A5A9-41971B50B93B}"/>
+                <a16:creationId xmlns:a16="http://schemas.microsoft.com/office/drawing/2014/main" id="{6954ED34-E542-4C7A-A5A9-41971B50B93B}"/>
               </a:ext>
             </a:extLst>
           </p:cNvPr>
@@ -19792,7 +20503,7 @@
           <p:cNvPr id="10" name="Foliennummernplatzhalter 9">
             <a:extLst>
               <a:ext uri="{FF2B5EF4-FFF2-40B4-BE49-F238E27FC236}">
-                <a16:creationId xmlns:a16="http://schemas.microsoft.com/office/drawing/2014/main" xmlns="" id="{D931436D-0B25-4BC2-AB85-D177B4C7ED90}"/>
+                <a16:creationId xmlns:a16="http://schemas.microsoft.com/office/drawing/2014/main" id="{D931436D-0B25-4BC2-AB85-D177B4C7ED90}"/>
               </a:ext>
             </a:extLst>
           </p:cNvPr>
@@ -19842,7 +20553,7 @@
           <p:cNvPr id="12" name="Gerader Verbinder 11">
             <a:extLst>
               <a:ext uri="{FF2B5EF4-FFF2-40B4-BE49-F238E27FC236}">
-                <a16:creationId xmlns:a16="http://schemas.microsoft.com/office/drawing/2014/main" xmlns="" id="{4A855513-E5C1-4F05-A8FD-33AC62C22A5E}"/>
+                <a16:creationId xmlns:a16="http://schemas.microsoft.com/office/drawing/2014/main" id="{4A855513-E5C1-4F05-A8FD-33AC62C22A5E}"/>
               </a:ext>
             </a:extLst>
           </p:cNvPr>
@@ -19883,7 +20594,7 @@
           <p:cNvPr id="13" name="Gerader Verbinder 12">
             <a:extLst>
               <a:ext uri="{FF2B5EF4-FFF2-40B4-BE49-F238E27FC236}">
-                <a16:creationId xmlns:a16="http://schemas.microsoft.com/office/drawing/2014/main" xmlns="" id="{F2778992-5E28-437C-AEA9-F9BBD6E6F5BB}"/>
+                <a16:creationId xmlns:a16="http://schemas.microsoft.com/office/drawing/2014/main" id="{F2778992-5E28-437C-AEA9-F9BBD6E6F5BB}"/>
               </a:ext>
             </a:extLst>
           </p:cNvPr>
@@ -19924,7 +20635,7 @@
           <p:cNvPr id="14" name="Textfeld 13">
             <a:extLst>
               <a:ext uri="{FF2B5EF4-FFF2-40B4-BE49-F238E27FC236}">
-                <a16:creationId xmlns:a16="http://schemas.microsoft.com/office/drawing/2014/main" xmlns="" id="{6CF8FF9D-8A98-4CFA-94C2-E2074112639C}"/>
+                <a16:creationId xmlns:a16="http://schemas.microsoft.com/office/drawing/2014/main" id="{6CF8FF9D-8A98-4CFA-94C2-E2074112639C}"/>
               </a:ext>
             </a:extLst>
           </p:cNvPr>
@@ -19960,7 +20671,7 @@
           <p:cNvPr id="6" name="Textfeld 5">
             <a:extLst>
               <a:ext uri="{FF2B5EF4-FFF2-40B4-BE49-F238E27FC236}">
-                <a16:creationId xmlns:a16="http://schemas.microsoft.com/office/drawing/2014/main" xmlns="" id="{8E05CB3E-FC8B-4C84-8452-A027AF29808D}"/>
+                <a16:creationId xmlns:a16="http://schemas.microsoft.com/office/drawing/2014/main" id="{8E05CB3E-FC8B-4C84-8452-A027AF29808D}"/>
               </a:ext>
             </a:extLst>
           </p:cNvPr>
@@ -20005,7 +20716,7 @@
           <p:cNvPr id="8" name="Textfeld 7">
             <a:extLst>
               <a:ext uri="{FF2B5EF4-FFF2-40B4-BE49-F238E27FC236}">
-                <a16:creationId xmlns:a16="http://schemas.microsoft.com/office/drawing/2014/main" xmlns="" id="{4842BEFA-10C3-45C0-8997-167BE0586DAC}"/>
+                <a16:creationId xmlns:a16="http://schemas.microsoft.com/office/drawing/2014/main" id="{4842BEFA-10C3-45C0-8997-167BE0586DAC}"/>
               </a:ext>
             </a:extLst>
           </p:cNvPr>
@@ -20195,7 +20906,7 @@
           <p:cNvPr id="3" name="Textfeld 2">
             <a:extLst>
               <a:ext uri="{FF2B5EF4-FFF2-40B4-BE49-F238E27FC236}">
-                <a16:creationId xmlns:a16="http://schemas.microsoft.com/office/drawing/2014/main" xmlns="" id="{B616C74B-1A1C-4612-8D7A-608508876D6B}"/>
+                <a16:creationId xmlns:a16="http://schemas.microsoft.com/office/drawing/2014/main" id="{B616C74B-1A1C-4612-8D7A-608508876D6B}"/>
               </a:ext>
             </a:extLst>
           </p:cNvPr>
@@ -20260,7 +20971,7 @@
           <p:cNvPr id="10" name="Foliennummernplatzhalter 9">
             <a:extLst>
               <a:ext uri="{FF2B5EF4-FFF2-40B4-BE49-F238E27FC236}">
-                <a16:creationId xmlns:a16="http://schemas.microsoft.com/office/drawing/2014/main" xmlns="" id="{D931436D-0B25-4BC2-AB85-D177B4C7ED90}"/>
+                <a16:creationId xmlns:a16="http://schemas.microsoft.com/office/drawing/2014/main" id="{D931436D-0B25-4BC2-AB85-D177B4C7ED90}"/>
               </a:ext>
             </a:extLst>
           </p:cNvPr>
@@ -20310,7 +21021,7 @@
           <p:cNvPr id="12" name="Gerader Verbinder 11">
             <a:extLst>
               <a:ext uri="{FF2B5EF4-FFF2-40B4-BE49-F238E27FC236}">
-                <a16:creationId xmlns:a16="http://schemas.microsoft.com/office/drawing/2014/main" xmlns="" id="{4A855513-E5C1-4F05-A8FD-33AC62C22A5E}"/>
+                <a16:creationId xmlns:a16="http://schemas.microsoft.com/office/drawing/2014/main" id="{4A855513-E5C1-4F05-A8FD-33AC62C22A5E}"/>
               </a:ext>
             </a:extLst>
           </p:cNvPr>
@@ -20351,7 +21062,7 @@
           <p:cNvPr id="13" name="Gerader Verbinder 12">
             <a:extLst>
               <a:ext uri="{FF2B5EF4-FFF2-40B4-BE49-F238E27FC236}">
-                <a16:creationId xmlns:a16="http://schemas.microsoft.com/office/drawing/2014/main" xmlns="" id="{F2778992-5E28-437C-AEA9-F9BBD6E6F5BB}"/>
+                <a16:creationId xmlns:a16="http://schemas.microsoft.com/office/drawing/2014/main" id="{F2778992-5E28-437C-AEA9-F9BBD6E6F5BB}"/>
               </a:ext>
             </a:extLst>
           </p:cNvPr>
@@ -20392,7 +21103,7 @@
           <p:cNvPr id="14" name="Textfeld 13">
             <a:extLst>
               <a:ext uri="{FF2B5EF4-FFF2-40B4-BE49-F238E27FC236}">
-                <a16:creationId xmlns:a16="http://schemas.microsoft.com/office/drawing/2014/main" xmlns="" id="{6CF8FF9D-8A98-4CFA-94C2-E2074112639C}"/>
+                <a16:creationId xmlns:a16="http://schemas.microsoft.com/office/drawing/2014/main" id="{6CF8FF9D-8A98-4CFA-94C2-E2074112639C}"/>
               </a:ext>
             </a:extLst>
           </p:cNvPr>
@@ -20428,7 +21139,7 @@
           <p:cNvPr id="6" name="Textfeld 5">
             <a:extLst>
               <a:ext uri="{FF2B5EF4-FFF2-40B4-BE49-F238E27FC236}">
-                <a16:creationId xmlns:a16="http://schemas.microsoft.com/office/drawing/2014/main" xmlns="" id="{8E05CB3E-FC8B-4C84-8452-A027AF29808D}"/>
+                <a16:creationId xmlns:a16="http://schemas.microsoft.com/office/drawing/2014/main" id="{8E05CB3E-FC8B-4C84-8452-A027AF29808D}"/>
               </a:ext>
             </a:extLst>
           </p:cNvPr>
@@ -20473,7 +21184,7 @@
           <p:cNvPr id="8" name="Textfeld 7">
             <a:extLst>
               <a:ext uri="{FF2B5EF4-FFF2-40B4-BE49-F238E27FC236}">
-                <a16:creationId xmlns:a16="http://schemas.microsoft.com/office/drawing/2014/main" xmlns="" id="{4842BEFA-10C3-45C0-8997-167BE0586DAC}"/>
+                <a16:creationId xmlns:a16="http://schemas.microsoft.com/office/drawing/2014/main" id="{4842BEFA-10C3-45C0-8997-167BE0586DAC}"/>
               </a:ext>
             </a:extLst>
           </p:cNvPr>
@@ -20555,7 +21266,7 @@
           <p:cNvPr id="3" name="Textfeld 2">
             <a:extLst>
               <a:ext uri="{FF2B5EF4-FFF2-40B4-BE49-F238E27FC236}">
-                <a16:creationId xmlns:a16="http://schemas.microsoft.com/office/drawing/2014/main" xmlns="" id="{B616C74B-1A1C-4612-8D7A-608508876D6B}"/>
+                <a16:creationId xmlns:a16="http://schemas.microsoft.com/office/drawing/2014/main" id="{B616C74B-1A1C-4612-8D7A-608508876D6B}"/>
               </a:ext>
             </a:extLst>
           </p:cNvPr>
@@ -20592,7 +21303,7 @@
               <p:cNvPr id="11" name="Textfeld 10">
                 <a:extLst>
                   <a:ext uri="{FF2B5EF4-FFF2-40B4-BE49-F238E27FC236}">
-                    <a16:creationId xmlns:a16="http://schemas.microsoft.com/office/drawing/2014/main" xmlns="" id="{592B9E84-39A5-4D8D-ACE3-4A007C83F662}"/>
+                    <a16:creationId xmlns:a16="http://schemas.microsoft.com/office/drawing/2014/main" id="{592B9E84-39A5-4D8D-ACE3-4A007C83F662}"/>
                   </a:ext>
                 </a:extLst>
               </p:cNvPr>
@@ -20783,7 +21494,7 @@
           <p:cNvPr id="9" name="Textfeld 8">
             <a:extLst>
               <a:ext uri="{FF2B5EF4-FFF2-40B4-BE49-F238E27FC236}">
-                <a16:creationId xmlns:a16="http://schemas.microsoft.com/office/drawing/2014/main" xmlns="" id="{E0E7220F-EA15-48B0-B65C-F7D03C8374E7}"/>
+                <a16:creationId xmlns:a16="http://schemas.microsoft.com/office/drawing/2014/main" id="{E0E7220F-EA15-48B0-B65C-F7D03C8374E7}"/>
               </a:ext>
             </a:extLst>
           </p:cNvPr>
@@ -20849,7 +21560,7 @@
           <p:cNvPr id="10" name="Foliennummernplatzhalter 9">
             <a:extLst>
               <a:ext uri="{FF2B5EF4-FFF2-40B4-BE49-F238E27FC236}">
-                <a16:creationId xmlns:a16="http://schemas.microsoft.com/office/drawing/2014/main" xmlns="" id="{D931436D-0B25-4BC2-AB85-D177B4C7ED90}"/>
+                <a16:creationId xmlns:a16="http://schemas.microsoft.com/office/drawing/2014/main" id="{D931436D-0B25-4BC2-AB85-D177B4C7ED90}"/>
               </a:ext>
             </a:extLst>
           </p:cNvPr>
@@ -20899,7 +21610,7 @@
           <p:cNvPr id="12" name="Gerader Verbinder 11">
             <a:extLst>
               <a:ext uri="{FF2B5EF4-FFF2-40B4-BE49-F238E27FC236}">
-                <a16:creationId xmlns:a16="http://schemas.microsoft.com/office/drawing/2014/main" xmlns="" id="{4A855513-E5C1-4F05-A8FD-33AC62C22A5E}"/>
+                <a16:creationId xmlns:a16="http://schemas.microsoft.com/office/drawing/2014/main" id="{4A855513-E5C1-4F05-A8FD-33AC62C22A5E}"/>
               </a:ext>
             </a:extLst>
           </p:cNvPr>
@@ -20940,7 +21651,7 @@
           <p:cNvPr id="13" name="Gerader Verbinder 12">
             <a:extLst>
               <a:ext uri="{FF2B5EF4-FFF2-40B4-BE49-F238E27FC236}">
-                <a16:creationId xmlns:a16="http://schemas.microsoft.com/office/drawing/2014/main" xmlns="" id="{F2778992-5E28-437C-AEA9-F9BBD6E6F5BB}"/>
+                <a16:creationId xmlns:a16="http://schemas.microsoft.com/office/drawing/2014/main" id="{F2778992-5E28-437C-AEA9-F9BBD6E6F5BB}"/>
               </a:ext>
             </a:extLst>
           </p:cNvPr>
@@ -20981,7 +21692,7 @@
           <p:cNvPr id="14" name="Textfeld 13">
             <a:extLst>
               <a:ext uri="{FF2B5EF4-FFF2-40B4-BE49-F238E27FC236}">
-                <a16:creationId xmlns:a16="http://schemas.microsoft.com/office/drawing/2014/main" xmlns="" id="{6CF8FF9D-8A98-4CFA-94C2-E2074112639C}"/>
+                <a16:creationId xmlns:a16="http://schemas.microsoft.com/office/drawing/2014/main" id="{6CF8FF9D-8A98-4CFA-94C2-E2074112639C}"/>
               </a:ext>
             </a:extLst>
           </p:cNvPr>
@@ -21017,7 +21728,7 @@
           <p:cNvPr id="6" name="Textfeld 5">
             <a:extLst>
               <a:ext uri="{FF2B5EF4-FFF2-40B4-BE49-F238E27FC236}">
-                <a16:creationId xmlns:a16="http://schemas.microsoft.com/office/drawing/2014/main" xmlns="" id="{8E05CB3E-FC8B-4C84-8452-A027AF29808D}"/>
+                <a16:creationId xmlns:a16="http://schemas.microsoft.com/office/drawing/2014/main" id="{8E05CB3E-FC8B-4C84-8452-A027AF29808D}"/>
               </a:ext>
             </a:extLst>
           </p:cNvPr>
@@ -21062,7 +21773,7 @@
           <p:cNvPr id="3" name="Textfeld 2">
             <a:extLst>
               <a:ext uri="{FF2B5EF4-FFF2-40B4-BE49-F238E27FC236}">
-                <a16:creationId xmlns:a16="http://schemas.microsoft.com/office/drawing/2014/main" xmlns="" id="{B616C74B-1A1C-4612-8D7A-608508876D6B}"/>
+                <a16:creationId xmlns:a16="http://schemas.microsoft.com/office/drawing/2014/main" id="{B616C74B-1A1C-4612-8D7A-608508876D6B}"/>
               </a:ext>
             </a:extLst>
           </p:cNvPr>
@@ -21097,7 +21808,7 @@
           <p:cNvPr id="15" name="Grafik 14">
             <a:extLst>
               <a:ext uri="{FF2B5EF4-FFF2-40B4-BE49-F238E27FC236}">
-                <a16:creationId xmlns:a16="http://schemas.microsoft.com/office/drawing/2014/main" xmlns="" id="{136B5BB8-033D-440E-AC9E-E20865012A33}"/>
+                <a16:creationId xmlns:a16="http://schemas.microsoft.com/office/drawing/2014/main" id="{136B5BB8-033D-440E-AC9E-E20865012A33}"/>
               </a:ext>
             </a:extLst>
           </p:cNvPr>
@@ -21127,7 +21838,7 @@
           <p:cNvPr id="16" name="Textfeld 15">
             <a:extLst>
               <a:ext uri="{FF2B5EF4-FFF2-40B4-BE49-F238E27FC236}">
-                <a16:creationId xmlns:a16="http://schemas.microsoft.com/office/drawing/2014/main" xmlns="" id="{9FB9C9A7-C04C-436A-82EC-08E6EA453C8E}"/>
+                <a16:creationId xmlns:a16="http://schemas.microsoft.com/office/drawing/2014/main" id="{9FB9C9A7-C04C-436A-82EC-08E6EA453C8E}"/>
               </a:ext>
             </a:extLst>
           </p:cNvPr>

</xml_diff>